<commit_message>
Add preliminary title slide to presentation.
</commit_message>
<xml_diff>
--- a/project/04-presentation/presentation.pptx
+++ b/project/04-presentation/presentation.pptx
@@ -5361,7 +5361,17 @@
           <a:bodyPr/>
           <a:lstStyle/>
           <a:p>
-            <a:endParaRPr lang="en-DE"/>
+            <a:r>
+              <a:rPr lang="en-DE" dirty="0"/>
+              <a:t>Software Engineering – Analysis</a:t>
+            </a:r>
+            <a:br>
+              <a:rPr lang="en-DE" dirty="0"/>
+            </a:br>
+            <a:r>
+              <a:rPr lang="en-DE" dirty="0"/>
+              <a:t>Project: E-Scooter Rental Service</a:t>
+            </a:r>
           </a:p>
         </p:txBody>
       </p:sp>
@@ -5383,10 +5393,12 @@
         </p:nvSpPr>
         <p:spPr/>
         <p:txBody>
-          <a:bodyPr/>
-          <a:lstStyle/>
-          <a:p>
-            <a:endParaRPr lang="en-DE"/>
+          <a:bodyPr>
+            <a:normAutofit/>
+          </a:bodyPr>
+          <a:lstStyle/>
+          <a:p>
+            <a:endParaRPr lang="en-US" dirty="0"/>
           </a:p>
         </p:txBody>
       </p:sp>

</xml_diff>

<commit_message>
Add title slide and basic structure to presentation.
</commit_message>
<xml_diff>
--- a/project/04-presentation/presentation.pptx
+++ b/project/04-presentation/presentation.pptx
@@ -2,10 +2,17 @@
 <file path=ppt/presentation.xml><?xml version="1.0" encoding="utf-8"?>
 <p:presentation xmlns:a="http://schemas.openxmlformats.org/drawingml/2006/main" xmlns:r="http://schemas.openxmlformats.org/officeDocument/2006/relationships" xmlns:p="http://schemas.openxmlformats.org/presentationml/2006/main" autoCompressPictures="0">
   <p:sldMasterIdLst>
-    <p:sldMasterId id="2147483648" r:id="rId1"/>
+    <p:sldMasterId id="2147483877" r:id="rId1"/>
   </p:sldMasterIdLst>
   <p:sldIdLst>
     <p:sldId id="256" r:id="rId2"/>
+    <p:sldId id="257" r:id="rId3"/>
+    <p:sldId id="258" r:id="rId4"/>
+    <p:sldId id="261" r:id="rId5"/>
+    <p:sldId id="259" r:id="rId6"/>
+    <p:sldId id="260" r:id="rId7"/>
+    <p:sldId id="262" r:id="rId8"/>
+    <p:sldId id="263" r:id="rId9"/>
   </p:sldIdLst>
   <p:sldSz cx="12192000" cy="6858000"/>
   <p:notesSz cx="6858000" cy="9144000"/>
@@ -392,9 +399,8 @@
           <a:bodyPr/>
           <a:lstStyle/>
           <a:p>
-            <a:fld id="{08B9EBBA-996F-894A-B54A-D6246ED52CEA}" type="datetimeFigureOut">
-              <a:rPr lang="en-US" dirty="0"/>
-              <a:pPr/>
+            <a:fld id="{02AC24A9-CCB6-4F8D-B8DB-C2F3692CFA5A}" type="datetimeFigureOut">
+              <a:rPr lang="en-US" smtClean="0"/>
               <a:t>2/5/20</a:t>
             </a:fld>
             <a:endParaRPr lang="en-US" dirty="0"/>
@@ -435,9 +441,8 @@
           <a:bodyPr/>
           <a:lstStyle/>
           <a:p>
-            <a:fld id="{D57F1E4F-1CFF-5643-939E-217C01CDF565}" type="slidenum">
-              <a:rPr lang="en-US" dirty="0"/>
-              <a:pPr/>
+            <a:fld id="{B2DC25EE-239B-4C5F-AAD1-255A7D5F1EE2}" type="slidenum">
+              <a:rPr lang="en-US" smtClean="0"/>
               <a:t>‹#›</a:t>
             </a:fld>
             <a:endParaRPr lang="en-US" dirty="0"/>
@@ -445,6 +450,11 @@
         </p:txBody>
       </p:sp>
     </p:spTree>
+    <p:extLst>
+      <p:ext uri="{BB962C8B-B14F-4D97-AF65-F5344CB8AC3E}">
+        <p14:creationId xmlns:p14="http://schemas.microsoft.com/office/powerpoint/2010/main" val="662686731"/>
+      </p:ext>
+    </p:extLst>
   </p:cSld>
   <p:clrMapOvr>
     <a:masterClrMapping/>
@@ -707,12 +717,11 @@
           <a:bodyPr/>
           <a:lstStyle/>
           <a:p>
-            <a:fld id="{18C79C5D-2A6F-F04D-97DA-BEF2467B64E4}" type="datetimeFigureOut">
-              <a:rPr lang="en-US" dirty="0"/>
-              <a:pPr/>
+            <a:fld id="{02AC24A9-CCB6-4F8D-B8DB-C2F3692CFA5A}" type="datetimeFigureOut">
+              <a:rPr lang="en-US" smtClean="0"/>
               <a:t>2/5/20</a:t>
             </a:fld>
-            <a:endParaRPr lang="en-US" dirty="0"/>
+            <a:endParaRPr lang="en-US"/>
           </a:p>
         </p:txBody>
       </p:sp>
@@ -731,7 +740,7 @@
           <a:bodyPr/>
           <a:lstStyle/>
           <a:p>
-            <a:endParaRPr lang="en-US" dirty="0"/>
+            <a:endParaRPr lang="en-US"/>
           </a:p>
         </p:txBody>
       </p:sp>
@@ -750,16 +759,20 @@
           <a:bodyPr/>
           <a:lstStyle/>
           <a:p>
-            <a:fld id="{D57F1E4F-1CFF-5643-939E-217C01CDF565}" type="slidenum">
-              <a:rPr lang="en-US" dirty="0"/>
-              <a:pPr/>
+            <a:fld id="{B2DC25EE-239B-4C5F-AAD1-255A7D5F1EE2}" type="slidenum">
+              <a:rPr lang="en-US" smtClean="0"/>
               <a:t>‹#›</a:t>
             </a:fld>
-            <a:endParaRPr lang="en-US" dirty="0"/>
+            <a:endParaRPr lang="en-US"/>
           </a:p>
         </p:txBody>
       </p:sp>
     </p:spTree>
+    <p:extLst>
+      <p:ext uri="{BB962C8B-B14F-4D97-AF65-F5344CB8AC3E}">
+        <p14:creationId xmlns:p14="http://schemas.microsoft.com/office/powerpoint/2010/main" val="419215524"/>
+      </p:ext>
+    </p:extLst>
   </p:cSld>
   <p:clrMapOvr>
     <a:masterClrMapping/>
@@ -1192,12 +1205,11 @@
           <a:bodyPr/>
           <a:lstStyle/>
           <a:p>
-            <a:fld id="{8DFA1846-DA80-1C48-A609-854EA85C59AD}" type="datetimeFigureOut">
-              <a:rPr lang="en-US" dirty="0"/>
-              <a:pPr/>
+            <a:fld id="{02AC24A9-CCB6-4F8D-B8DB-C2F3692CFA5A}" type="datetimeFigureOut">
+              <a:rPr lang="en-US" smtClean="0"/>
               <a:t>2/5/20</a:t>
             </a:fld>
-            <a:endParaRPr lang="en-US" dirty="0"/>
+            <a:endParaRPr lang="en-US"/>
           </a:p>
         </p:txBody>
       </p:sp>
@@ -1216,7 +1228,7 @@
           <a:bodyPr/>
           <a:lstStyle/>
           <a:p>
-            <a:endParaRPr lang="en-US" dirty="0"/>
+            <a:endParaRPr lang="en-US"/>
           </a:p>
         </p:txBody>
       </p:sp>
@@ -1235,16 +1247,20 @@
           <a:bodyPr/>
           <a:lstStyle/>
           <a:p>
-            <a:fld id="{D57F1E4F-1CFF-5643-939E-217C01CDF565}" type="slidenum">
-              <a:rPr lang="en-US" dirty="0"/>
-              <a:pPr/>
+            <a:fld id="{B2DC25EE-239B-4C5F-AAD1-255A7D5F1EE2}" type="slidenum">
+              <a:rPr lang="en-US" smtClean="0"/>
               <a:t>‹#›</a:t>
             </a:fld>
-            <a:endParaRPr lang="en-US" dirty="0"/>
+            <a:endParaRPr lang="en-US"/>
           </a:p>
         </p:txBody>
       </p:sp>
     </p:spTree>
+    <p:extLst>
+      <p:ext uri="{BB962C8B-B14F-4D97-AF65-F5344CB8AC3E}">
+        <p14:creationId xmlns:p14="http://schemas.microsoft.com/office/powerpoint/2010/main" val="4287403179"/>
+      </p:ext>
+    </p:extLst>
   </p:cSld>
   <p:clrMapOvr>
     <a:masterClrMapping/>
@@ -1558,12 +1574,11 @@
           <a:bodyPr/>
           <a:lstStyle/>
           <a:p>
-            <a:fld id="{FBF54567-0DE4-3F47-BF90-CB84690072F9}" type="datetimeFigureOut">
-              <a:rPr lang="en-US" dirty="0"/>
-              <a:pPr/>
+            <a:fld id="{02AC24A9-CCB6-4F8D-B8DB-C2F3692CFA5A}" type="datetimeFigureOut">
+              <a:rPr lang="en-US" smtClean="0"/>
               <a:t>2/5/20</a:t>
             </a:fld>
-            <a:endParaRPr lang="en-US" dirty="0"/>
+            <a:endParaRPr lang="en-US"/>
           </a:p>
         </p:txBody>
       </p:sp>
@@ -1582,7 +1597,7 @@
           <a:bodyPr/>
           <a:lstStyle/>
           <a:p>
-            <a:endParaRPr lang="en-US" dirty="0"/>
+            <a:endParaRPr lang="en-US"/>
           </a:p>
         </p:txBody>
       </p:sp>
@@ -1601,16 +1616,20 @@
           <a:bodyPr/>
           <a:lstStyle/>
           <a:p>
-            <a:fld id="{D57F1E4F-1CFF-5643-939E-217C01CDF565}" type="slidenum">
-              <a:rPr lang="en-US" dirty="0"/>
-              <a:pPr/>
+            <a:fld id="{B2DC25EE-239B-4C5F-AAD1-255A7D5F1EE2}" type="slidenum">
+              <a:rPr lang="en-US" smtClean="0"/>
               <a:t>‹#›</a:t>
             </a:fld>
-            <a:endParaRPr lang="en-US" dirty="0"/>
+            <a:endParaRPr lang="en-US"/>
           </a:p>
         </p:txBody>
       </p:sp>
     </p:spTree>
+    <p:extLst>
+      <p:ext uri="{BB962C8B-B14F-4D97-AF65-F5344CB8AC3E}">
+        <p14:creationId xmlns:p14="http://schemas.microsoft.com/office/powerpoint/2010/main" val="2887994352"/>
+      </p:ext>
+    </p:extLst>
   </p:cSld>
   <p:clrMapOvr>
     <a:masterClrMapping/>
@@ -1828,12 +1847,11 @@
           <a:bodyPr/>
           <a:lstStyle/>
           <a:p>
-            <a:fld id="{C6C52C72-DE31-F449-A4ED-4C594FD91407}" type="datetimeFigureOut">
-              <a:rPr lang="en-US" dirty="0"/>
-              <a:pPr/>
+            <a:fld id="{02AC24A9-CCB6-4F8D-B8DB-C2F3692CFA5A}" type="datetimeFigureOut">
+              <a:rPr lang="en-US" smtClean="0"/>
               <a:t>2/5/20</a:t>
             </a:fld>
-            <a:endParaRPr lang="en-US" dirty="0"/>
+            <a:endParaRPr lang="en-US"/>
           </a:p>
         </p:txBody>
       </p:sp>
@@ -1852,7 +1870,7 @@
           <a:bodyPr/>
           <a:lstStyle/>
           <a:p>
-            <a:endParaRPr lang="en-US" dirty="0"/>
+            <a:endParaRPr lang="en-US"/>
           </a:p>
         </p:txBody>
       </p:sp>
@@ -1871,16 +1889,20 @@
           <a:bodyPr/>
           <a:lstStyle/>
           <a:p>
-            <a:fld id="{D57F1E4F-1CFF-5643-939E-217C01CDF565}" type="slidenum">
-              <a:rPr lang="en-US" dirty="0"/>
-              <a:pPr/>
+            <a:fld id="{B2DC25EE-239B-4C5F-AAD1-255A7D5F1EE2}" type="slidenum">
+              <a:rPr lang="en-US" smtClean="0"/>
               <a:t>‹#›</a:t>
             </a:fld>
-            <a:endParaRPr lang="en-US" dirty="0"/>
+            <a:endParaRPr lang="en-US"/>
           </a:p>
         </p:txBody>
       </p:sp>
     </p:spTree>
+    <p:extLst>
+      <p:ext uri="{BB962C8B-B14F-4D97-AF65-F5344CB8AC3E}">
+        <p14:creationId xmlns:p14="http://schemas.microsoft.com/office/powerpoint/2010/main" val="3376589181"/>
+      </p:ext>
+    </p:extLst>
   </p:cSld>
   <p:clrMapOvr>
     <a:masterClrMapping/>
@@ -2110,12 +2132,11 @@
           <a:bodyPr/>
           <a:lstStyle/>
           <a:p>
-            <a:fld id="{ED62726E-379B-B349-9EED-81ED093FA806}" type="datetimeFigureOut">
-              <a:rPr lang="en-US" dirty="0"/>
-              <a:pPr/>
+            <a:fld id="{02AC24A9-CCB6-4F8D-B8DB-C2F3692CFA5A}" type="datetimeFigureOut">
+              <a:rPr lang="en-US" smtClean="0"/>
               <a:t>2/5/20</a:t>
             </a:fld>
-            <a:endParaRPr lang="en-US" dirty="0"/>
+            <a:endParaRPr lang="en-US"/>
           </a:p>
         </p:txBody>
       </p:sp>
@@ -2134,7 +2155,7 @@
           <a:bodyPr/>
           <a:lstStyle/>
           <a:p>
-            <a:endParaRPr lang="en-US" dirty="0"/>
+            <a:endParaRPr lang="en-US"/>
           </a:p>
         </p:txBody>
       </p:sp>
@@ -2153,16 +2174,20 @@
           <a:bodyPr/>
           <a:lstStyle/>
           <a:p>
-            <a:fld id="{D57F1E4F-1CFF-5643-939E-217C01CDF565}" type="slidenum">
-              <a:rPr lang="en-US" dirty="0"/>
-              <a:pPr/>
+            <a:fld id="{B2DC25EE-239B-4C5F-AAD1-255A7D5F1EE2}" type="slidenum">
+              <a:rPr lang="en-US" smtClean="0"/>
               <a:t>‹#›</a:t>
             </a:fld>
-            <a:endParaRPr lang="en-US" dirty="0"/>
+            <a:endParaRPr lang="en-US"/>
           </a:p>
         </p:txBody>
       </p:sp>
     </p:spTree>
+    <p:extLst>
+      <p:ext uri="{BB962C8B-B14F-4D97-AF65-F5344CB8AC3E}">
+        <p14:creationId xmlns:p14="http://schemas.microsoft.com/office/powerpoint/2010/main" val="872012912"/>
+      </p:ext>
+    </p:extLst>
   </p:cSld>
   <p:clrMapOvr>
     <a:masterClrMapping/>
@@ -2390,12 +2415,11 @@
           <a:bodyPr/>
           <a:lstStyle/>
           <a:p>
-            <a:fld id="{9B3A1323-8D79-1946-B0D7-40001CF92E9D}" type="datetimeFigureOut">
-              <a:rPr lang="en-US" dirty="0"/>
-              <a:pPr/>
+            <a:fld id="{02AC24A9-CCB6-4F8D-B8DB-C2F3692CFA5A}" type="datetimeFigureOut">
+              <a:rPr lang="en-US" smtClean="0"/>
               <a:t>2/5/20</a:t>
             </a:fld>
-            <a:endParaRPr lang="en-US" dirty="0"/>
+            <a:endParaRPr lang="en-US"/>
           </a:p>
         </p:txBody>
       </p:sp>
@@ -2414,7 +2438,7 @@
           <a:bodyPr/>
           <a:lstStyle/>
           <a:p>
-            <a:endParaRPr lang="en-US" dirty="0"/>
+            <a:endParaRPr lang="en-US"/>
           </a:p>
         </p:txBody>
       </p:sp>
@@ -2433,16 +2457,20 @@
           <a:bodyPr/>
           <a:lstStyle/>
           <a:p>
-            <a:fld id="{D57F1E4F-1CFF-5643-939E-217C01CDF565}" type="slidenum">
-              <a:rPr lang="en-US" dirty="0"/>
-              <a:pPr/>
+            <a:fld id="{B2DC25EE-239B-4C5F-AAD1-255A7D5F1EE2}" type="slidenum">
+              <a:rPr lang="en-US" smtClean="0"/>
               <a:t>‹#›</a:t>
             </a:fld>
-            <a:endParaRPr lang="en-US" dirty="0"/>
+            <a:endParaRPr lang="en-US"/>
           </a:p>
         </p:txBody>
       </p:sp>
     </p:spTree>
+    <p:extLst>
+      <p:ext uri="{BB962C8B-B14F-4D97-AF65-F5344CB8AC3E}">
+        <p14:creationId xmlns:p14="http://schemas.microsoft.com/office/powerpoint/2010/main" val="1139578229"/>
+      </p:ext>
+    </p:extLst>
   </p:cSld>
   <p:clrMapOvr>
     <a:masterClrMapping/>
@@ -2730,12 +2758,11 @@
           <a:bodyPr/>
           <a:lstStyle/>
           <a:p>
-            <a:fld id="{8DFA1846-DA80-1C48-A609-854EA85C59AD}" type="datetimeFigureOut">
-              <a:rPr lang="en-US" dirty="0"/>
-              <a:pPr/>
+            <a:fld id="{02AC24A9-CCB6-4F8D-B8DB-C2F3692CFA5A}" type="datetimeFigureOut">
+              <a:rPr lang="en-US" smtClean="0"/>
               <a:t>2/5/20</a:t>
             </a:fld>
-            <a:endParaRPr lang="en-US" dirty="0"/>
+            <a:endParaRPr lang="en-US"/>
           </a:p>
         </p:txBody>
       </p:sp>
@@ -2754,7 +2781,7 @@
           <a:bodyPr/>
           <a:lstStyle/>
           <a:p>
-            <a:endParaRPr lang="en-US" dirty="0"/>
+            <a:endParaRPr lang="en-US"/>
           </a:p>
         </p:txBody>
       </p:sp>
@@ -2773,16 +2800,20 @@
           <a:bodyPr/>
           <a:lstStyle/>
           <a:p>
-            <a:fld id="{D57F1E4F-1CFF-5643-939E-217C01CDF565}" type="slidenum">
-              <a:rPr lang="en-US" dirty="0"/>
-              <a:pPr/>
+            <a:fld id="{B2DC25EE-239B-4C5F-AAD1-255A7D5F1EE2}" type="slidenum">
+              <a:rPr lang="en-US" smtClean="0"/>
               <a:t>‹#›</a:t>
             </a:fld>
-            <a:endParaRPr lang="en-US" dirty="0"/>
+            <a:endParaRPr lang="en-US"/>
           </a:p>
         </p:txBody>
       </p:sp>
     </p:spTree>
+    <p:extLst>
+      <p:ext uri="{BB962C8B-B14F-4D97-AF65-F5344CB8AC3E}">
+        <p14:creationId xmlns:p14="http://schemas.microsoft.com/office/powerpoint/2010/main" val="3777724229"/>
+      </p:ext>
+    </p:extLst>
   </p:cSld>
   <p:clrMapOvr>
     <a:masterClrMapping/>
@@ -3066,12 +3097,11 @@
           <a:bodyPr/>
           <a:lstStyle/>
           <a:p>
-            <a:fld id="{57302355-E14B-8545-A8F8-0FE83CC9D524}" type="datetimeFigureOut">
-              <a:rPr lang="en-US" dirty="0"/>
-              <a:pPr/>
+            <a:fld id="{02AC24A9-CCB6-4F8D-B8DB-C2F3692CFA5A}" type="datetimeFigureOut">
+              <a:rPr lang="en-US" smtClean="0"/>
               <a:t>2/5/20</a:t>
             </a:fld>
-            <a:endParaRPr lang="en-US" dirty="0"/>
+            <a:endParaRPr lang="en-US"/>
           </a:p>
         </p:txBody>
       </p:sp>
@@ -3090,7 +3120,7 @@
           <a:bodyPr/>
           <a:lstStyle/>
           <a:p>
-            <a:endParaRPr lang="en-US" dirty="0"/>
+            <a:endParaRPr lang="en-US"/>
           </a:p>
         </p:txBody>
       </p:sp>
@@ -3109,16 +3139,20 @@
           <a:bodyPr/>
           <a:lstStyle/>
           <a:p>
-            <a:fld id="{D57F1E4F-1CFF-5643-939E-217C01CDF565}" type="slidenum">
-              <a:rPr lang="en-US" dirty="0"/>
-              <a:pPr/>
+            <a:fld id="{B2DC25EE-239B-4C5F-AAD1-255A7D5F1EE2}" type="slidenum">
+              <a:rPr lang="en-US" smtClean="0"/>
               <a:t>‹#›</a:t>
             </a:fld>
-            <a:endParaRPr lang="en-US" dirty="0"/>
+            <a:endParaRPr lang="en-US"/>
           </a:p>
         </p:txBody>
       </p:sp>
     </p:spTree>
+    <p:extLst>
+      <p:ext uri="{BB962C8B-B14F-4D97-AF65-F5344CB8AC3E}">
+        <p14:creationId xmlns:p14="http://schemas.microsoft.com/office/powerpoint/2010/main" val="758235282"/>
+      </p:ext>
+    </p:extLst>
   </p:cSld>
   <p:clrMapOvr>
     <a:masterClrMapping/>
@@ -3540,12 +3574,11 @@
           <a:bodyPr/>
           <a:lstStyle/>
           <a:p>
-            <a:fld id="{02640F58-564D-2B4F-AE67-E407BA4FCF45}" type="datetimeFigureOut">
-              <a:rPr lang="en-US" dirty="0"/>
-              <a:pPr/>
+            <a:fld id="{02AC24A9-CCB6-4F8D-B8DB-C2F3692CFA5A}" type="datetimeFigureOut">
+              <a:rPr lang="en-US" smtClean="0"/>
               <a:t>2/5/20</a:t>
             </a:fld>
-            <a:endParaRPr lang="en-US" dirty="0"/>
+            <a:endParaRPr lang="en-US"/>
           </a:p>
         </p:txBody>
       </p:sp>
@@ -3564,7 +3597,7 @@
           <a:bodyPr/>
           <a:lstStyle/>
           <a:p>
-            <a:endParaRPr lang="en-US" dirty="0"/>
+            <a:endParaRPr lang="en-US"/>
           </a:p>
         </p:txBody>
       </p:sp>
@@ -3583,16 +3616,20 @@
           <a:bodyPr/>
           <a:lstStyle/>
           <a:p>
-            <a:fld id="{D57F1E4F-1CFF-5643-939E-217C01CDF565}" type="slidenum">
-              <a:rPr lang="en-US" dirty="0"/>
-              <a:pPr/>
+            <a:fld id="{B2DC25EE-239B-4C5F-AAD1-255A7D5F1EE2}" type="slidenum">
+              <a:rPr lang="en-US" smtClean="0"/>
               <a:t>‹#›</a:t>
             </a:fld>
-            <a:endParaRPr lang="en-US" dirty="0"/>
+            <a:endParaRPr lang="en-US"/>
           </a:p>
         </p:txBody>
       </p:sp>
     </p:spTree>
+    <p:extLst>
+      <p:ext uri="{BB962C8B-B14F-4D97-AF65-F5344CB8AC3E}">
+        <p14:creationId xmlns:p14="http://schemas.microsoft.com/office/powerpoint/2010/main" val="1570854770"/>
+      </p:ext>
+    </p:extLst>
   </p:cSld>
   <p:clrMapOvr>
     <a:masterClrMapping/>
@@ -3758,12 +3795,11 @@
           <a:bodyPr/>
           <a:lstStyle/>
           <a:p>
-            <a:fld id="{F13A34C8-038E-2045-AF43-DF7DBB8E0E9E}" type="datetimeFigureOut">
-              <a:rPr lang="en-US" dirty="0"/>
-              <a:pPr/>
+            <a:fld id="{02AC24A9-CCB6-4F8D-B8DB-C2F3692CFA5A}" type="datetimeFigureOut">
+              <a:rPr lang="en-US" smtClean="0"/>
               <a:t>2/5/20</a:t>
             </a:fld>
-            <a:endParaRPr lang="en-US" dirty="0"/>
+            <a:endParaRPr lang="en-US"/>
           </a:p>
         </p:txBody>
       </p:sp>
@@ -3782,7 +3818,7 @@
           <a:bodyPr/>
           <a:lstStyle/>
           <a:p>
-            <a:endParaRPr lang="en-US" dirty="0"/>
+            <a:endParaRPr lang="en-US"/>
           </a:p>
         </p:txBody>
       </p:sp>
@@ -3801,16 +3837,20 @@
           <a:bodyPr/>
           <a:lstStyle/>
           <a:p>
-            <a:fld id="{D57F1E4F-1CFF-5643-939E-217C01CDF565}" type="slidenum">
-              <a:rPr lang="en-US" dirty="0"/>
-              <a:pPr/>
+            <a:fld id="{B2DC25EE-239B-4C5F-AAD1-255A7D5F1EE2}" type="slidenum">
+              <a:rPr lang="en-US" smtClean="0"/>
               <a:t>‹#›</a:t>
             </a:fld>
-            <a:endParaRPr lang="en-US" dirty="0"/>
+            <a:endParaRPr lang="en-US"/>
           </a:p>
         </p:txBody>
       </p:sp>
     </p:spTree>
+    <p:extLst>
+      <p:ext uri="{BB962C8B-B14F-4D97-AF65-F5344CB8AC3E}">
+        <p14:creationId xmlns:p14="http://schemas.microsoft.com/office/powerpoint/2010/main" val="2337907729"/>
+      </p:ext>
+    </p:extLst>
   </p:cSld>
   <p:clrMapOvr>
     <a:masterClrMapping/>
@@ -3850,12 +3890,11 @@
           <a:bodyPr/>
           <a:lstStyle/>
           <a:p>
-            <a:fld id="{8818C68F-D26B-8F47-958C-23B49CF8A634}" type="datetimeFigureOut">
-              <a:rPr lang="en-US" dirty="0"/>
-              <a:pPr/>
+            <a:fld id="{02AC24A9-CCB6-4F8D-B8DB-C2F3692CFA5A}" type="datetimeFigureOut">
+              <a:rPr lang="en-US" smtClean="0"/>
               <a:t>2/5/20</a:t>
             </a:fld>
-            <a:endParaRPr lang="en-US" dirty="0"/>
+            <a:endParaRPr lang="en-US"/>
           </a:p>
         </p:txBody>
       </p:sp>
@@ -3874,7 +3913,7 @@
           <a:bodyPr/>
           <a:lstStyle/>
           <a:p>
-            <a:endParaRPr lang="en-US" dirty="0"/>
+            <a:endParaRPr lang="en-US"/>
           </a:p>
         </p:txBody>
       </p:sp>
@@ -3893,16 +3932,20 @@
           <a:bodyPr/>
           <a:lstStyle/>
           <a:p>
-            <a:fld id="{D57F1E4F-1CFF-5643-939E-217C01CDF565}" type="slidenum">
-              <a:rPr lang="en-US" dirty="0"/>
-              <a:pPr/>
+            <a:fld id="{B2DC25EE-239B-4C5F-AAD1-255A7D5F1EE2}" type="slidenum">
+              <a:rPr lang="en-US" smtClean="0"/>
               <a:t>‹#›</a:t>
             </a:fld>
-            <a:endParaRPr lang="en-US" dirty="0"/>
+            <a:endParaRPr lang="en-US"/>
           </a:p>
         </p:txBody>
       </p:sp>
     </p:spTree>
+    <p:extLst>
+      <p:ext uri="{BB962C8B-B14F-4D97-AF65-F5344CB8AC3E}">
+        <p14:creationId xmlns:p14="http://schemas.microsoft.com/office/powerpoint/2010/main" val="3258196723"/>
+      </p:ext>
+    </p:extLst>
   </p:cSld>
   <p:clrMapOvr>
     <a:masterClrMapping/>
@@ -4314,9 +4357,8 @@
           <a:bodyPr/>
           <a:lstStyle/>
           <a:p>
-            <a:fld id="{D0DF5E60-9974-AC48-9591-99C2BB44B7CF}" type="datetimeFigureOut">
-              <a:rPr lang="en-US" dirty="0"/>
-              <a:pPr/>
+            <a:fld id="{02AC24A9-CCB6-4F8D-B8DB-C2F3692CFA5A}" type="datetimeFigureOut">
+              <a:rPr lang="en-US" smtClean="0"/>
               <a:t>2/5/20</a:t>
             </a:fld>
             <a:endParaRPr lang="en-US" dirty="0"/>
@@ -4338,7 +4380,7 @@
           <a:bodyPr/>
           <a:lstStyle/>
           <a:p>
-            <a:endParaRPr lang="en-US" dirty="0"/>
+            <a:endParaRPr lang="en-US"/>
           </a:p>
         </p:txBody>
       </p:sp>
@@ -4357,16 +4399,20 @@
           <a:bodyPr/>
           <a:lstStyle/>
           <a:p>
-            <a:fld id="{D57F1E4F-1CFF-5643-939E-217C01CDF565}" type="slidenum">
-              <a:rPr lang="en-US" dirty="0"/>
-              <a:pPr/>
+            <a:fld id="{B2DC25EE-239B-4C5F-AAD1-255A7D5F1EE2}" type="slidenum">
+              <a:rPr lang="en-US" smtClean="0"/>
               <a:t>‹#›</a:t>
             </a:fld>
-            <a:endParaRPr lang="en-US" dirty="0"/>
+            <a:endParaRPr lang="en-US"/>
           </a:p>
         </p:txBody>
       </p:sp>
     </p:spTree>
+    <p:extLst>
+      <p:ext uri="{BB962C8B-B14F-4D97-AF65-F5344CB8AC3E}">
+        <p14:creationId xmlns:p14="http://schemas.microsoft.com/office/powerpoint/2010/main" val="720458840"/>
+      </p:ext>
+    </p:extLst>
   </p:cSld>
   <p:clrMapOvr>
     <a:masterClrMapping/>
@@ -4624,12 +4670,11 @@
           <a:bodyPr/>
           <a:lstStyle/>
           <a:p>
-            <a:fld id="{18C79C5D-2A6F-F04D-97DA-BEF2467B64E4}" type="datetimeFigureOut">
-              <a:rPr lang="en-US" dirty="0"/>
-              <a:pPr/>
+            <a:fld id="{02AC24A9-CCB6-4F8D-B8DB-C2F3692CFA5A}" type="datetimeFigureOut">
+              <a:rPr lang="en-US" smtClean="0"/>
               <a:t>2/5/20</a:t>
             </a:fld>
-            <a:endParaRPr lang="en-US" dirty="0"/>
+            <a:endParaRPr lang="en-US"/>
           </a:p>
         </p:txBody>
       </p:sp>
@@ -4653,7 +4698,7 @@
           <a:bodyPr/>
           <a:lstStyle/>
           <a:p>
-            <a:endParaRPr lang="en-US" dirty="0"/>
+            <a:endParaRPr lang="en-US"/>
           </a:p>
         </p:txBody>
       </p:sp>
@@ -4677,16 +4722,20 @@
           <a:bodyPr/>
           <a:lstStyle/>
           <a:p>
-            <a:fld id="{D57F1E4F-1CFF-5643-939E-217C01CDF565}" type="slidenum">
-              <a:rPr lang="en-US" dirty="0"/>
-              <a:pPr/>
+            <a:fld id="{B2DC25EE-239B-4C5F-AAD1-255A7D5F1EE2}" type="slidenum">
+              <a:rPr lang="en-US" smtClean="0"/>
               <a:t>‹#›</a:t>
             </a:fld>
-            <a:endParaRPr lang="en-US" dirty="0"/>
+            <a:endParaRPr lang="en-US"/>
           </a:p>
         </p:txBody>
       </p:sp>
     </p:spTree>
+    <p:extLst>
+      <p:ext uri="{BB962C8B-B14F-4D97-AF65-F5344CB8AC3E}">
+        <p14:creationId xmlns:p14="http://schemas.microsoft.com/office/powerpoint/2010/main" val="2272713678"/>
+      </p:ext>
+    </p:extLst>
   </p:cSld>
   <p:clrMapOvr>
     <a:masterClrMapping/>
@@ -4856,7 +4905,7 @@
             </a:lvl1pPr>
           </a:lstStyle>
           <a:p>
-            <a:endParaRPr lang="en-US" dirty="0"/>
+            <a:endParaRPr lang="en-US"/>
           </a:p>
         </p:txBody>
       </p:sp>
@@ -4891,12 +4940,11 @@
             </a:lvl1pPr>
           </a:lstStyle>
           <a:p>
-            <a:fld id="{09B482E8-6E0E-1B4F-B1FD-C69DB9E858D9}" type="datetimeFigureOut">
-              <a:rPr lang="en-US" dirty="0"/>
-              <a:pPr/>
+            <a:fld id="{02AC24A9-CCB6-4F8D-B8DB-C2F3692CFA5A}" type="datetimeFigureOut">
+              <a:rPr lang="en-US" smtClean="0"/>
               <a:t>2/5/20</a:t>
             </a:fld>
-            <a:endParaRPr lang="en-US" dirty="0"/>
+            <a:endParaRPr lang="en-US"/>
           </a:p>
         </p:txBody>
       </p:sp>
@@ -4931,35 +4979,38 @@
             </a:lvl1pPr>
           </a:lstStyle>
           <a:p>
-            <a:fld id="{D57F1E4F-1CFF-5643-939E-217C01CDF565}" type="slidenum">
-              <a:rPr lang="en-US" dirty="0"/>
-              <a:pPr/>
+            <a:fld id="{B2DC25EE-239B-4C5F-AAD1-255A7D5F1EE2}" type="slidenum">
+              <a:rPr lang="en-US" smtClean="0"/>
               <a:t>‹#›</a:t>
             </a:fld>
-            <a:endParaRPr lang="en-US" dirty="0"/>
+            <a:endParaRPr lang="en-US"/>
           </a:p>
         </p:txBody>
       </p:sp>
     </p:spTree>
+    <p:extLst>
+      <p:ext uri="{BB962C8B-B14F-4D97-AF65-F5344CB8AC3E}">
+        <p14:creationId xmlns:p14="http://schemas.microsoft.com/office/powerpoint/2010/main" val="3346648112"/>
+      </p:ext>
+    </p:extLst>
   </p:cSld>
   <p:clrMap bg1="dk1" tx1="lt1" bg2="dk2" tx2="lt2" accent1="accent1" accent2="accent2" accent3="accent3" accent4="accent4" accent5="accent5" accent6="accent6" hlink="hlink" folHlink="folHlink"/>
   <p:sldLayoutIdLst>
-    <p:sldLayoutId id="2147483649" r:id="rId1"/>
-    <p:sldLayoutId id="2147483650" r:id="rId2"/>
-    <p:sldLayoutId id="2147483651" r:id="rId3"/>
-    <p:sldLayoutId id="2147483652" r:id="rId4"/>
-    <p:sldLayoutId id="2147483653" r:id="rId5"/>
-    <p:sldLayoutId id="2147483654" r:id="rId6"/>
-    <p:sldLayoutId id="2147483655" r:id="rId7"/>
-    <p:sldLayoutId id="2147483656" r:id="rId8"/>
-    <p:sldLayoutId id="2147483663" r:id="rId9"/>
-    <p:sldLayoutId id="2147483657" r:id="rId10"/>
-    <p:sldLayoutId id="2147483666" r:id="rId11"/>
-    <p:sldLayoutId id="2147483661" r:id="rId12"/>
-    <p:sldLayoutId id="2147483658" r:id="rId13"/>
-    <p:sldLayoutId id="2147483659" r:id="rId14"/>
+    <p:sldLayoutId id="2147483878" r:id="rId1"/>
+    <p:sldLayoutId id="2147483879" r:id="rId2"/>
+    <p:sldLayoutId id="2147483880" r:id="rId3"/>
+    <p:sldLayoutId id="2147483881" r:id="rId4"/>
+    <p:sldLayoutId id="2147483882" r:id="rId5"/>
+    <p:sldLayoutId id="2147483883" r:id="rId6"/>
+    <p:sldLayoutId id="2147483884" r:id="rId7"/>
+    <p:sldLayoutId id="2147483885" r:id="rId8"/>
+    <p:sldLayoutId id="2147483886" r:id="rId9"/>
+    <p:sldLayoutId id="2147483887" r:id="rId10"/>
+    <p:sldLayoutId id="2147483888" r:id="rId11"/>
+    <p:sldLayoutId id="2147483889" r:id="rId12"/>
+    <p:sldLayoutId id="2147483890" r:id="rId13"/>
+    <p:sldLayoutId id="2147483891" r:id="rId14"/>
   </p:sldLayoutIdLst>
-  <p:hf sldNum="0" hdr="0" ftr="0" dt="0"/>
   <p:txStyles>
     <p:titleStyle>
       <a:lvl1pPr algn="l" defTabSz="457200" rtl="0" eaLnBrk="1" latinLnBrk="0" hangingPunct="1">
@@ -5326,6 +5377,14 @@
 <file path=ppt/slides/slide1.xml><?xml version="1.0" encoding="utf-8"?>
 <p:sld xmlns:a="http://schemas.openxmlformats.org/drawingml/2006/main" xmlns:r="http://schemas.openxmlformats.org/officeDocument/2006/relationships" xmlns:p="http://schemas.openxmlformats.org/presentationml/2006/main">
   <p:cSld>
+    <p:bg>
+      <p:bgPr>
+        <a:solidFill>
+          <a:schemeClr val="bg2"/>
+        </a:solidFill>
+        <a:effectLst/>
+      </p:bgPr>
+    </p:bg>
     <p:spTree>
       <p:nvGrpSpPr>
         <p:cNvPr id="1" name=""/>
@@ -5342,6 +5401,126 @@
       </p:grpSpPr>
       <p:sp>
         <p:nvSpPr>
+          <p:cNvPr id="23" name="Freeform 6">
+            <a:extLst>
+              <a:ext uri="{FF2B5EF4-FFF2-40B4-BE49-F238E27FC236}">
+                <a16:creationId xmlns:a16="http://schemas.microsoft.com/office/drawing/2014/main" id="{53576798-7F98-4C7F-B6C7-6D41B5A7E927}"/>
+              </a:ext>
+              <a:ext uri="{C183D7F6-B498-43B3-948B-1728B52AA6E4}">
+                <adec:decorative xmlns:adec="http://schemas.microsoft.com/office/drawing/2017/decorative" val="1"/>
+              </a:ext>
+            </a:extLst>
+          </p:cNvPr>
+          <p:cNvSpPr>
+            <a:spLocks noGrp="1" noRot="1" noChangeAspect="1" noMove="1" noResize="1" noEditPoints="1" noAdjustHandles="1" noChangeArrowheads="1" noChangeShapeType="1" noTextEdit="1"/>
+          </p:cNvSpPr>
+          <p:nvPr>
+            <p:extLst>
+              <p:ext uri="{386F3935-93C4-4BCD-93E2-E3B085C9AB24}">
+                <p16:designElem xmlns:p16="http://schemas.microsoft.com/office/powerpoint/2015/main" val="1"/>
+              </p:ext>
+            </p:extLst>
+          </p:nvPr>
+        </p:nvSpPr>
+        <p:spPr bwMode="auto">
+          <a:xfrm>
+            <a:off x="0" y="0"/>
+            <a:ext cx="12192000" cy="2185988"/>
+          </a:xfrm>
+          <a:custGeom>
+            <a:avLst/>
+            <a:gdLst/>
+            <a:ahLst/>
+            <a:cxnLst/>
+            <a:rect l="0" t="0" r="r" b="b"/>
+            <a:pathLst>
+              <a:path w="5760" h="1377">
+                <a:moveTo>
+                  <a:pt x="5760" y="0"/>
+                </a:moveTo>
+                <a:lnTo>
+                  <a:pt x="0" y="0"/>
+                </a:lnTo>
+                <a:lnTo>
+                  <a:pt x="0" y="1189"/>
+                </a:lnTo>
+                <a:lnTo>
+                  <a:pt x="943" y="1189"/>
+                </a:lnTo>
+                <a:lnTo>
+                  <a:pt x="1123" y="1369"/>
+                </a:lnTo>
+                <a:lnTo>
+                  <a:pt x="1123" y="1369"/>
+                </a:lnTo>
+                <a:lnTo>
+                  <a:pt x="1127" y="1371"/>
+                </a:lnTo>
+                <a:lnTo>
+                  <a:pt x="1133" y="1374"/>
+                </a:lnTo>
+                <a:lnTo>
+                  <a:pt x="1139" y="1377"/>
+                </a:lnTo>
+                <a:lnTo>
+                  <a:pt x="1144" y="1377"/>
+                </a:lnTo>
+                <a:lnTo>
+                  <a:pt x="1150" y="1377"/>
+                </a:lnTo>
+                <a:lnTo>
+                  <a:pt x="1155" y="1374"/>
+                </a:lnTo>
+                <a:lnTo>
+                  <a:pt x="1161" y="1371"/>
+                </a:lnTo>
+                <a:lnTo>
+                  <a:pt x="1165" y="1369"/>
+                </a:lnTo>
+                <a:lnTo>
+                  <a:pt x="1345" y="1189"/>
+                </a:lnTo>
+                <a:lnTo>
+                  <a:pt x="5760" y="1189"/>
+                </a:lnTo>
+                <a:lnTo>
+                  <a:pt x="5760" y="0"/>
+                </a:lnTo>
+                <a:close/>
+              </a:path>
+            </a:pathLst>
+          </a:custGeom>
+          <a:ln/>
+          <a:extLst>
+            <a:ext uri="{91240B29-F687-4f45-9708-019B960494DF}">
+              <a14:hiddenLine xmlns:a14="http://schemas.microsoft.com/office/drawing/2010/main" xmlns:p14="http://schemas.microsoft.com/office/powerpoint/2010/main" xmlns:a16="http://schemas.microsoft.com/office/drawing/2014/main" xmlns="" w="9525">
+                <a:solidFill>
+                  <a:srgbClr val="000000"/>
+                </a:solidFill>
+                <a:round/>
+                <a:headEnd/>
+                <a:tailEnd/>
+              </a14:hiddenLine>
+            </a:ext>
+          </a:extLst>
+        </p:spPr>
+        <p:style>
+          <a:lnRef idx="1">
+            <a:schemeClr val="accent1"/>
+          </a:lnRef>
+          <a:fillRef idx="3">
+            <a:schemeClr val="accent1"/>
+          </a:fillRef>
+          <a:effectRef idx="2">
+            <a:schemeClr val="accent1"/>
+          </a:effectRef>
+          <a:fontRef idx="minor">
+            <a:schemeClr val="lt1"/>
+          </a:fontRef>
+        </p:style>
+      </p:sp>
+      <p:sp>
+        <p:nvSpPr>
           <p:cNvPr id="2" name="Title 1">
             <a:extLst>
               <a:ext uri="{FF2B5EF4-FFF2-40B4-BE49-F238E27FC236}">
@@ -5356,20 +5535,32 @@
             <p:ph type="ctrTitle"/>
           </p:nvPr>
         </p:nvSpPr>
-        <p:spPr/>
-        <p:txBody>
-          <a:bodyPr/>
-          <a:lstStyle/>
-          <a:p>
-            <a:r>
-              <a:rPr lang="en-DE" dirty="0"/>
+        <p:spPr>
+          <a:xfrm>
+            <a:off x="810000" y="447188"/>
+            <a:ext cx="10571998" cy="970450"/>
+          </a:xfrm>
+        </p:spPr>
+        <p:txBody>
+          <a:bodyPr vert="horz" lIns="91440" tIns="45720" rIns="91440" bIns="45720" rtlCol="0" anchor="b">
+            <a:normAutofit/>
+          </a:bodyPr>
+          <a:lstStyle/>
+          <a:p>
+            <a:pPr>
+              <a:lnSpc>
+                <a:spcPct val="90000"/>
+              </a:lnSpc>
+            </a:pPr>
+            <a:r>
+              <a:rPr lang="en-US" sz="3100"/>
               <a:t>Software Engineering – Analysis</a:t>
             </a:r>
             <a:br>
-              <a:rPr lang="en-DE" dirty="0"/>
+              <a:rPr lang="en-US" sz="3100"/>
             </a:br>
             <a:r>
-              <a:rPr lang="en-DE" dirty="0"/>
+              <a:rPr lang="en-US" sz="3100"/>
               <a:t>Project: E-Scooter Rental Service</a:t>
             </a:r>
           </a:p>
@@ -5377,10 +5568,10 @@
       </p:sp>
       <p:sp>
         <p:nvSpPr>
-          <p:cNvPr id="3" name="Subtitle 2">
+          <p:cNvPr id="4" name="Subtitle 3">
             <a:extLst>
               <a:ext uri="{FF2B5EF4-FFF2-40B4-BE49-F238E27FC236}">
-                <a16:creationId xmlns:a16="http://schemas.microsoft.com/office/drawing/2014/main" id="{9FCDFF3D-EAA0-AD45-B505-8F66400C77AE}"/>
+                <a16:creationId xmlns:a16="http://schemas.microsoft.com/office/drawing/2014/main" id="{82ADE1A1-DAA7-5C43-86F4-0FFFD5D4B7C0}"/>
               </a:ext>
             </a:extLst>
           </p:cNvPr>
@@ -5391,21 +5582,727 @@
             <p:ph type="subTitle" idx="1"/>
           </p:nvPr>
         </p:nvSpPr>
-        <p:spPr/>
-        <p:txBody>
-          <a:bodyPr>
+        <p:spPr>
+          <a:xfrm>
+            <a:off x="810000" y="1739196"/>
+            <a:ext cx="3835583" cy="3632200"/>
+          </a:xfrm>
+        </p:spPr>
+        <p:txBody>
+          <a:bodyPr vert="horz" lIns="91440" tIns="45720" rIns="91440" bIns="45720" rtlCol="0" anchor="ctr">
             <a:normAutofit/>
           </a:bodyPr>
           <a:lstStyle/>
           <a:p>
-            <a:endParaRPr lang="en-US" dirty="0"/>
-          </a:p>
-        </p:txBody>
-      </p:sp>
+            <a:pPr indent="-228600">
+              <a:buFont typeface="Wingdings 2" charset="2"/>
+              <a:buChar char=""/>
+            </a:pPr>
+            <a:r>
+              <a:rPr lang="en-US" sz="1600" dirty="0"/>
+              <a:t>Kendra </a:t>
+            </a:r>
+            <a:r>
+              <a:rPr lang="en-US" sz="1600" dirty="0" err="1"/>
+              <a:t>Birringer</a:t>
+            </a:r>
+            <a:r>
+              <a:rPr lang="en-US" sz="1600" dirty="0"/>
+              <a:t> (1229372)</a:t>
+            </a:r>
+          </a:p>
+          <a:p>
+            <a:pPr indent="-228600">
+              <a:buFont typeface="Wingdings 2" charset="2"/>
+              <a:buChar char=""/>
+            </a:pPr>
+            <a:r>
+              <a:rPr lang="en-US" sz="1600" dirty="0"/>
+              <a:t>Nader </a:t>
+            </a:r>
+            <a:r>
+              <a:rPr lang="en-US" sz="1600" dirty="0" err="1"/>
+              <a:t>Cacace</a:t>
+            </a:r>
+            <a:r>
+              <a:rPr lang="en-US" sz="1600" dirty="0"/>
+              <a:t> (1208115)</a:t>
+            </a:r>
+          </a:p>
+          <a:p>
+            <a:pPr indent="-228600">
+              <a:buFont typeface="Wingdings 2" charset="2"/>
+              <a:buChar char=""/>
+            </a:pPr>
+            <a:r>
+              <a:rPr lang="en-US" sz="1600" dirty="0"/>
+              <a:t>Steffen </a:t>
+            </a:r>
+            <a:r>
+              <a:rPr lang="en-US" sz="1600" dirty="0" err="1"/>
+              <a:t>Hanzlik</a:t>
+            </a:r>
+            <a:r>
+              <a:rPr lang="en-US" sz="1600" dirty="0"/>
+              <a:t> (1207417)</a:t>
+            </a:r>
+          </a:p>
+          <a:p>
+            <a:pPr indent="-228600">
+              <a:buFont typeface="Wingdings 2" charset="2"/>
+              <a:buChar char=""/>
+            </a:pPr>
+            <a:r>
+              <a:rPr lang="en-US" sz="1600" dirty="0"/>
+              <a:t>Marco Peluso (1228849)</a:t>
+            </a:r>
+          </a:p>
+          <a:p>
+            <a:pPr indent="-228600">
+              <a:buFont typeface="Wingdings 2" charset="2"/>
+              <a:buChar char=""/>
+            </a:pPr>
+            <a:r>
+              <a:rPr lang="en-US" sz="1600" dirty="0" err="1"/>
+              <a:t>Svetozar</a:t>
+            </a:r>
+            <a:r>
+              <a:rPr lang="en-US" sz="1600" dirty="0"/>
+              <a:t> </a:t>
+            </a:r>
+            <a:r>
+              <a:rPr lang="en-US" sz="1600" dirty="0" err="1"/>
+              <a:t>Stojanovic</a:t>
+            </a:r>
+            <a:r>
+              <a:rPr lang="en-US" sz="1600" dirty="0"/>
+              <a:t> (1262287)</a:t>
+            </a:r>
+          </a:p>
+        </p:txBody>
+      </p:sp>
+      <p:pic>
+        <p:nvPicPr>
+          <p:cNvPr id="3" name="Picture 2">
+            <a:extLst>
+              <a:ext uri="{FF2B5EF4-FFF2-40B4-BE49-F238E27FC236}">
+                <a16:creationId xmlns:a16="http://schemas.microsoft.com/office/drawing/2014/main" id="{FB56CDD4-A8EE-43CF-A411-637E87558A22}"/>
+              </a:ext>
+            </a:extLst>
+          </p:cNvPr>
+          <p:cNvPicPr>
+            <a:picLocks noChangeAspect="1"/>
+          </p:cNvPicPr>
+          <p:nvPr/>
+        </p:nvPicPr>
+        <p:blipFill rotWithShape="1">
+          <a:blip r:embed="rId2"/>
+          <a:srcRect t="15916" b="21766"/>
+          <a:stretch/>
+        </p:blipFill>
+        <p:spPr>
+          <a:xfrm>
+            <a:off x="5101851" y="3170942"/>
+            <a:ext cx="6277349" cy="2200454"/>
+          </a:xfrm>
+          <a:prstGeom prst="roundRect">
+            <a:avLst>
+              <a:gd name="adj" fmla="val 3876"/>
+            </a:avLst>
+          </a:prstGeom>
+          <a:ln>
+            <a:solidFill>
+              <a:schemeClr val="accent1"/>
+            </a:solidFill>
+          </a:ln>
+          <a:effectLst/>
+        </p:spPr>
+      </p:pic>
     </p:spTree>
     <p:extLst>
       <p:ext uri="{BB962C8B-B14F-4D97-AF65-F5344CB8AC3E}">
         <p14:creationId xmlns:p14="http://schemas.microsoft.com/office/powerpoint/2010/main" val="3512287786"/>
+      </p:ext>
+    </p:extLst>
+  </p:cSld>
+  <p:clrMapOvr>
+    <a:masterClrMapping/>
+  </p:clrMapOvr>
+</p:sld>
+</file>
+
+<file path=ppt/slides/slide2.xml><?xml version="1.0" encoding="utf-8"?>
+<p:sld xmlns:a="http://schemas.openxmlformats.org/drawingml/2006/main" xmlns:r="http://schemas.openxmlformats.org/officeDocument/2006/relationships" xmlns:p="http://schemas.openxmlformats.org/presentationml/2006/main">
+  <p:cSld>
+    <p:spTree>
+      <p:nvGrpSpPr>
+        <p:cNvPr id="1" name=""/>
+        <p:cNvGrpSpPr/>
+        <p:nvPr/>
+      </p:nvGrpSpPr>
+      <p:grpSpPr>
+        <a:xfrm>
+          <a:off x="0" y="0"/>
+          <a:ext cx="0" cy="0"/>
+          <a:chOff x="0" y="0"/>
+          <a:chExt cx="0" cy="0"/>
+        </a:xfrm>
+      </p:grpSpPr>
+      <p:sp>
+        <p:nvSpPr>
+          <p:cNvPr id="2" name="Title 1">
+            <a:extLst>
+              <a:ext uri="{FF2B5EF4-FFF2-40B4-BE49-F238E27FC236}">
+                <a16:creationId xmlns:a16="http://schemas.microsoft.com/office/drawing/2014/main" id="{6B657D03-958C-284D-9791-C2000607D52E}"/>
+              </a:ext>
+            </a:extLst>
+          </p:cNvPr>
+          <p:cNvSpPr>
+            <a:spLocks noGrp="1"/>
+          </p:cNvSpPr>
+          <p:nvPr>
+            <p:ph type="title"/>
+          </p:nvPr>
+        </p:nvSpPr>
+        <p:spPr/>
+        <p:txBody>
+          <a:bodyPr/>
+          <a:lstStyle/>
+          <a:p>
+            <a:r>
+              <a:rPr lang="en-DE" dirty="0"/>
+              <a:t>Introduction</a:t>
+            </a:r>
+          </a:p>
+        </p:txBody>
+      </p:sp>
+      <p:sp>
+        <p:nvSpPr>
+          <p:cNvPr id="3" name="Content Placeholder 2">
+            <a:extLst>
+              <a:ext uri="{FF2B5EF4-FFF2-40B4-BE49-F238E27FC236}">
+                <a16:creationId xmlns:a16="http://schemas.microsoft.com/office/drawing/2014/main" id="{BC28FF24-7889-6242-A147-8274A53C26CE}"/>
+              </a:ext>
+            </a:extLst>
+          </p:cNvPr>
+          <p:cNvSpPr>
+            <a:spLocks noGrp="1"/>
+          </p:cNvSpPr>
+          <p:nvPr>
+            <p:ph idx="1"/>
+          </p:nvPr>
+        </p:nvSpPr>
+        <p:spPr/>
+        <p:txBody>
+          <a:bodyPr/>
+          <a:lstStyle/>
+          <a:p>
+            <a:endParaRPr lang="en-DE" dirty="0"/>
+          </a:p>
+        </p:txBody>
+      </p:sp>
+    </p:spTree>
+    <p:extLst>
+      <p:ext uri="{BB962C8B-B14F-4D97-AF65-F5344CB8AC3E}">
+        <p14:creationId xmlns:p14="http://schemas.microsoft.com/office/powerpoint/2010/main" val="3037554933"/>
+      </p:ext>
+    </p:extLst>
+  </p:cSld>
+  <p:clrMapOvr>
+    <a:masterClrMapping/>
+  </p:clrMapOvr>
+</p:sld>
+</file>
+
+<file path=ppt/slides/slide3.xml><?xml version="1.0" encoding="utf-8"?>
+<p:sld xmlns:a="http://schemas.openxmlformats.org/drawingml/2006/main" xmlns:r="http://schemas.openxmlformats.org/officeDocument/2006/relationships" xmlns:p="http://schemas.openxmlformats.org/presentationml/2006/main">
+  <p:cSld>
+    <p:spTree>
+      <p:nvGrpSpPr>
+        <p:cNvPr id="1" name=""/>
+        <p:cNvGrpSpPr/>
+        <p:nvPr/>
+      </p:nvGrpSpPr>
+      <p:grpSpPr>
+        <a:xfrm>
+          <a:off x="0" y="0"/>
+          <a:ext cx="0" cy="0"/>
+          <a:chOff x="0" y="0"/>
+          <a:chExt cx="0" cy="0"/>
+        </a:xfrm>
+      </p:grpSpPr>
+      <p:sp>
+        <p:nvSpPr>
+          <p:cNvPr id="2" name="Title 1">
+            <a:extLst>
+              <a:ext uri="{FF2B5EF4-FFF2-40B4-BE49-F238E27FC236}">
+                <a16:creationId xmlns:a16="http://schemas.microsoft.com/office/drawing/2014/main" id="{1487B8BA-7F5C-7B4E-9612-08C24C2E2D1C}"/>
+              </a:ext>
+            </a:extLst>
+          </p:cNvPr>
+          <p:cNvSpPr>
+            <a:spLocks noGrp="1"/>
+          </p:cNvSpPr>
+          <p:nvPr>
+            <p:ph type="title"/>
+          </p:nvPr>
+        </p:nvSpPr>
+        <p:spPr/>
+        <p:txBody>
+          <a:bodyPr/>
+          <a:lstStyle/>
+          <a:p>
+            <a:r>
+              <a:rPr lang="en-DE" dirty="0"/>
+              <a:t>Requirements</a:t>
+            </a:r>
+          </a:p>
+        </p:txBody>
+      </p:sp>
+      <p:sp>
+        <p:nvSpPr>
+          <p:cNvPr id="3" name="Content Placeholder 2">
+            <a:extLst>
+              <a:ext uri="{FF2B5EF4-FFF2-40B4-BE49-F238E27FC236}">
+                <a16:creationId xmlns:a16="http://schemas.microsoft.com/office/drawing/2014/main" id="{DD5D1A2D-5C69-AC41-99A7-CF12FBA521D9}"/>
+              </a:ext>
+            </a:extLst>
+          </p:cNvPr>
+          <p:cNvSpPr>
+            <a:spLocks noGrp="1"/>
+          </p:cNvSpPr>
+          <p:nvPr>
+            <p:ph idx="1"/>
+          </p:nvPr>
+        </p:nvSpPr>
+        <p:spPr/>
+        <p:txBody>
+          <a:bodyPr/>
+          <a:lstStyle/>
+          <a:p>
+            <a:endParaRPr lang="en-DE"/>
+          </a:p>
+        </p:txBody>
+      </p:sp>
+    </p:spTree>
+    <p:extLst>
+      <p:ext uri="{BB962C8B-B14F-4D97-AF65-F5344CB8AC3E}">
+        <p14:creationId xmlns:p14="http://schemas.microsoft.com/office/powerpoint/2010/main" val="3747206429"/>
+      </p:ext>
+    </p:extLst>
+  </p:cSld>
+  <p:clrMapOvr>
+    <a:masterClrMapping/>
+  </p:clrMapOvr>
+</p:sld>
+</file>
+
+<file path=ppt/slides/slide4.xml><?xml version="1.0" encoding="utf-8"?>
+<p:sld xmlns:a="http://schemas.openxmlformats.org/drawingml/2006/main" xmlns:r="http://schemas.openxmlformats.org/officeDocument/2006/relationships" xmlns:p="http://schemas.openxmlformats.org/presentationml/2006/main">
+  <p:cSld>
+    <p:spTree>
+      <p:nvGrpSpPr>
+        <p:cNvPr id="1" name=""/>
+        <p:cNvGrpSpPr/>
+        <p:nvPr/>
+      </p:nvGrpSpPr>
+      <p:grpSpPr>
+        <a:xfrm>
+          <a:off x="0" y="0"/>
+          <a:ext cx="0" cy="0"/>
+          <a:chOff x="0" y="0"/>
+          <a:chExt cx="0" cy="0"/>
+        </a:xfrm>
+      </p:grpSpPr>
+      <p:sp>
+        <p:nvSpPr>
+          <p:cNvPr id="2" name="Title 1">
+            <a:extLst>
+              <a:ext uri="{FF2B5EF4-FFF2-40B4-BE49-F238E27FC236}">
+                <a16:creationId xmlns:a16="http://schemas.microsoft.com/office/drawing/2014/main" id="{9E46FF31-07D7-434E-8774-519E2701CE11}"/>
+              </a:ext>
+            </a:extLst>
+          </p:cNvPr>
+          <p:cNvSpPr>
+            <a:spLocks noGrp="1"/>
+          </p:cNvSpPr>
+          <p:nvPr>
+            <p:ph type="title"/>
+          </p:nvPr>
+        </p:nvSpPr>
+        <p:spPr/>
+        <p:txBody>
+          <a:bodyPr/>
+          <a:lstStyle/>
+          <a:p>
+            <a:r>
+              <a:rPr lang="en-DE" dirty="0"/>
+              <a:t>Class Diagram</a:t>
+            </a:r>
+          </a:p>
+        </p:txBody>
+      </p:sp>
+      <p:sp>
+        <p:nvSpPr>
+          <p:cNvPr id="3" name="Content Placeholder 2">
+            <a:extLst>
+              <a:ext uri="{FF2B5EF4-FFF2-40B4-BE49-F238E27FC236}">
+                <a16:creationId xmlns:a16="http://schemas.microsoft.com/office/drawing/2014/main" id="{5346A739-9DF0-4E4D-AE38-1C82E89735B7}"/>
+              </a:ext>
+            </a:extLst>
+          </p:cNvPr>
+          <p:cNvSpPr>
+            <a:spLocks noGrp="1"/>
+          </p:cNvSpPr>
+          <p:nvPr>
+            <p:ph idx="1"/>
+          </p:nvPr>
+        </p:nvSpPr>
+        <p:spPr/>
+        <p:txBody>
+          <a:bodyPr/>
+          <a:lstStyle/>
+          <a:p>
+            <a:endParaRPr lang="en-DE"/>
+          </a:p>
+        </p:txBody>
+      </p:sp>
+    </p:spTree>
+    <p:extLst>
+      <p:ext uri="{BB962C8B-B14F-4D97-AF65-F5344CB8AC3E}">
+        <p14:creationId xmlns:p14="http://schemas.microsoft.com/office/powerpoint/2010/main" val="3175897578"/>
+      </p:ext>
+    </p:extLst>
+  </p:cSld>
+  <p:clrMapOvr>
+    <a:masterClrMapping/>
+  </p:clrMapOvr>
+</p:sld>
+</file>
+
+<file path=ppt/slides/slide5.xml><?xml version="1.0" encoding="utf-8"?>
+<p:sld xmlns:a="http://schemas.openxmlformats.org/drawingml/2006/main" xmlns:r="http://schemas.openxmlformats.org/officeDocument/2006/relationships" xmlns:p="http://schemas.openxmlformats.org/presentationml/2006/main">
+  <p:cSld>
+    <p:spTree>
+      <p:nvGrpSpPr>
+        <p:cNvPr id="1" name=""/>
+        <p:cNvGrpSpPr/>
+        <p:nvPr/>
+      </p:nvGrpSpPr>
+      <p:grpSpPr>
+        <a:xfrm>
+          <a:off x="0" y="0"/>
+          <a:ext cx="0" cy="0"/>
+          <a:chOff x="0" y="0"/>
+          <a:chExt cx="0" cy="0"/>
+        </a:xfrm>
+      </p:grpSpPr>
+      <p:sp>
+        <p:nvSpPr>
+          <p:cNvPr id="2" name="Title 1">
+            <a:extLst>
+              <a:ext uri="{FF2B5EF4-FFF2-40B4-BE49-F238E27FC236}">
+                <a16:creationId xmlns:a16="http://schemas.microsoft.com/office/drawing/2014/main" id="{81D4C5FA-360C-CC4D-8E4D-78F7028815B4}"/>
+              </a:ext>
+            </a:extLst>
+          </p:cNvPr>
+          <p:cNvSpPr>
+            <a:spLocks noGrp="1"/>
+          </p:cNvSpPr>
+          <p:nvPr>
+            <p:ph type="title"/>
+          </p:nvPr>
+        </p:nvSpPr>
+        <p:spPr/>
+        <p:txBody>
+          <a:bodyPr/>
+          <a:lstStyle/>
+          <a:p>
+            <a:r>
+              <a:rPr lang="en-DE" dirty="0"/>
+              <a:t>Use-Case Diagram</a:t>
+            </a:r>
+          </a:p>
+        </p:txBody>
+      </p:sp>
+      <p:sp>
+        <p:nvSpPr>
+          <p:cNvPr id="3" name="Content Placeholder 2">
+            <a:extLst>
+              <a:ext uri="{FF2B5EF4-FFF2-40B4-BE49-F238E27FC236}">
+                <a16:creationId xmlns:a16="http://schemas.microsoft.com/office/drawing/2014/main" id="{21559E1A-EFE7-EB46-84A4-7ACB4A357570}"/>
+              </a:ext>
+            </a:extLst>
+          </p:cNvPr>
+          <p:cNvSpPr>
+            <a:spLocks noGrp="1"/>
+          </p:cNvSpPr>
+          <p:nvPr>
+            <p:ph idx="1"/>
+          </p:nvPr>
+        </p:nvSpPr>
+        <p:spPr/>
+        <p:txBody>
+          <a:bodyPr/>
+          <a:lstStyle/>
+          <a:p>
+            <a:endParaRPr lang="en-DE" dirty="0"/>
+          </a:p>
+        </p:txBody>
+      </p:sp>
+    </p:spTree>
+    <p:extLst>
+      <p:ext uri="{BB962C8B-B14F-4D97-AF65-F5344CB8AC3E}">
+        <p14:creationId xmlns:p14="http://schemas.microsoft.com/office/powerpoint/2010/main" val="2943699180"/>
+      </p:ext>
+    </p:extLst>
+  </p:cSld>
+  <p:clrMapOvr>
+    <a:masterClrMapping/>
+  </p:clrMapOvr>
+</p:sld>
+</file>
+
+<file path=ppt/slides/slide6.xml><?xml version="1.0" encoding="utf-8"?>
+<p:sld xmlns:a="http://schemas.openxmlformats.org/drawingml/2006/main" xmlns:r="http://schemas.openxmlformats.org/officeDocument/2006/relationships" xmlns:p="http://schemas.openxmlformats.org/presentationml/2006/main">
+  <p:cSld>
+    <p:spTree>
+      <p:nvGrpSpPr>
+        <p:cNvPr id="1" name=""/>
+        <p:cNvGrpSpPr/>
+        <p:nvPr/>
+      </p:nvGrpSpPr>
+      <p:grpSpPr>
+        <a:xfrm>
+          <a:off x="0" y="0"/>
+          <a:ext cx="0" cy="0"/>
+          <a:chOff x="0" y="0"/>
+          <a:chExt cx="0" cy="0"/>
+        </a:xfrm>
+      </p:grpSpPr>
+      <p:sp>
+        <p:nvSpPr>
+          <p:cNvPr id="2" name="Title 1">
+            <a:extLst>
+              <a:ext uri="{FF2B5EF4-FFF2-40B4-BE49-F238E27FC236}">
+                <a16:creationId xmlns:a16="http://schemas.microsoft.com/office/drawing/2014/main" id="{FEB63499-928A-EA4A-AD45-E22AE8DDAB86}"/>
+              </a:ext>
+            </a:extLst>
+          </p:cNvPr>
+          <p:cNvSpPr>
+            <a:spLocks noGrp="1"/>
+          </p:cNvSpPr>
+          <p:nvPr>
+            <p:ph type="title"/>
+          </p:nvPr>
+        </p:nvSpPr>
+        <p:spPr/>
+        <p:txBody>
+          <a:bodyPr/>
+          <a:lstStyle/>
+          <a:p>
+            <a:r>
+              <a:rPr lang="en-DE" dirty="0"/>
+              <a:t>Activity Diagram</a:t>
+            </a:r>
+          </a:p>
+        </p:txBody>
+      </p:sp>
+      <p:sp>
+        <p:nvSpPr>
+          <p:cNvPr id="3" name="Content Placeholder 2">
+            <a:extLst>
+              <a:ext uri="{FF2B5EF4-FFF2-40B4-BE49-F238E27FC236}">
+                <a16:creationId xmlns:a16="http://schemas.microsoft.com/office/drawing/2014/main" id="{7A8B443F-ECC2-3545-954E-63990F7541C0}"/>
+              </a:ext>
+            </a:extLst>
+          </p:cNvPr>
+          <p:cNvSpPr>
+            <a:spLocks noGrp="1"/>
+          </p:cNvSpPr>
+          <p:nvPr>
+            <p:ph idx="1"/>
+          </p:nvPr>
+        </p:nvSpPr>
+        <p:spPr/>
+        <p:txBody>
+          <a:bodyPr/>
+          <a:lstStyle/>
+          <a:p>
+            <a:endParaRPr lang="en-DE"/>
+          </a:p>
+        </p:txBody>
+      </p:sp>
+    </p:spTree>
+    <p:extLst>
+      <p:ext uri="{BB962C8B-B14F-4D97-AF65-F5344CB8AC3E}">
+        <p14:creationId xmlns:p14="http://schemas.microsoft.com/office/powerpoint/2010/main" val="947049165"/>
+      </p:ext>
+    </p:extLst>
+  </p:cSld>
+  <p:clrMapOvr>
+    <a:masterClrMapping/>
+  </p:clrMapOvr>
+</p:sld>
+</file>
+
+<file path=ppt/slides/slide7.xml><?xml version="1.0" encoding="utf-8"?>
+<p:sld xmlns:a="http://schemas.openxmlformats.org/drawingml/2006/main" xmlns:r="http://schemas.openxmlformats.org/officeDocument/2006/relationships" xmlns:p="http://schemas.openxmlformats.org/presentationml/2006/main">
+  <p:cSld>
+    <p:spTree>
+      <p:nvGrpSpPr>
+        <p:cNvPr id="1" name=""/>
+        <p:cNvGrpSpPr/>
+        <p:nvPr/>
+      </p:nvGrpSpPr>
+      <p:grpSpPr>
+        <a:xfrm>
+          <a:off x="0" y="0"/>
+          <a:ext cx="0" cy="0"/>
+          <a:chOff x="0" y="0"/>
+          <a:chExt cx="0" cy="0"/>
+        </a:xfrm>
+      </p:grpSpPr>
+      <p:sp>
+        <p:nvSpPr>
+          <p:cNvPr id="2" name="Title 1">
+            <a:extLst>
+              <a:ext uri="{FF2B5EF4-FFF2-40B4-BE49-F238E27FC236}">
+                <a16:creationId xmlns:a16="http://schemas.microsoft.com/office/drawing/2014/main" id="{065771F3-AF2B-964F-9058-25FFCF110F7F}"/>
+              </a:ext>
+            </a:extLst>
+          </p:cNvPr>
+          <p:cNvSpPr>
+            <a:spLocks noGrp="1"/>
+          </p:cNvSpPr>
+          <p:nvPr>
+            <p:ph type="title"/>
+          </p:nvPr>
+        </p:nvSpPr>
+        <p:spPr/>
+        <p:txBody>
+          <a:bodyPr/>
+          <a:lstStyle/>
+          <a:p>
+            <a:r>
+              <a:rPr lang="en-DE" dirty="0"/>
+              <a:t>Sequence Diagram</a:t>
+            </a:r>
+          </a:p>
+        </p:txBody>
+      </p:sp>
+      <p:sp>
+        <p:nvSpPr>
+          <p:cNvPr id="3" name="Content Placeholder 2">
+            <a:extLst>
+              <a:ext uri="{FF2B5EF4-FFF2-40B4-BE49-F238E27FC236}">
+                <a16:creationId xmlns:a16="http://schemas.microsoft.com/office/drawing/2014/main" id="{736EBC44-1CAB-C342-AEF4-2805A558B4AA}"/>
+              </a:ext>
+            </a:extLst>
+          </p:cNvPr>
+          <p:cNvSpPr>
+            <a:spLocks noGrp="1"/>
+          </p:cNvSpPr>
+          <p:nvPr>
+            <p:ph idx="1"/>
+          </p:nvPr>
+        </p:nvSpPr>
+        <p:spPr/>
+        <p:txBody>
+          <a:bodyPr/>
+          <a:lstStyle/>
+          <a:p>
+            <a:endParaRPr lang="en-DE"/>
+          </a:p>
+        </p:txBody>
+      </p:sp>
+    </p:spTree>
+    <p:extLst>
+      <p:ext uri="{BB962C8B-B14F-4D97-AF65-F5344CB8AC3E}">
+        <p14:creationId xmlns:p14="http://schemas.microsoft.com/office/powerpoint/2010/main" val="1016021226"/>
+      </p:ext>
+    </p:extLst>
+  </p:cSld>
+  <p:clrMapOvr>
+    <a:masterClrMapping/>
+  </p:clrMapOvr>
+</p:sld>
+</file>
+
+<file path=ppt/slides/slide8.xml><?xml version="1.0" encoding="utf-8"?>
+<p:sld xmlns:a="http://schemas.openxmlformats.org/drawingml/2006/main" xmlns:r="http://schemas.openxmlformats.org/officeDocument/2006/relationships" xmlns:p="http://schemas.openxmlformats.org/presentationml/2006/main">
+  <p:cSld>
+    <p:spTree>
+      <p:nvGrpSpPr>
+        <p:cNvPr id="1" name=""/>
+        <p:cNvGrpSpPr/>
+        <p:nvPr/>
+      </p:nvGrpSpPr>
+      <p:grpSpPr>
+        <a:xfrm>
+          <a:off x="0" y="0"/>
+          <a:ext cx="0" cy="0"/>
+          <a:chOff x="0" y="0"/>
+          <a:chExt cx="0" cy="0"/>
+        </a:xfrm>
+      </p:grpSpPr>
+      <p:sp>
+        <p:nvSpPr>
+          <p:cNvPr id="2" name="Title 1">
+            <a:extLst>
+              <a:ext uri="{FF2B5EF4-FFF2-40B4-BE49-F238E27FC236}">
+                <a16:creationId xmlns:a16="http://schemas.microsoft.com/office/drawing/2014/main" id="{9169552A-FC02-7C4A-93F3-14B5ACAC67DD}"/>
+              </a:ext>
+            </a:extLst>
+          </p:cNvPr>
+          <p:cNvSpPr>
+            <a:spLocks noGrp="1"/>
+          </p:cNvSpPr>
+          <p:nvPr>
+            <p:ph type="title"/>
+          </p:nvPr>
+        </p:nvSpPr>
+        <p:spPr/>
+        <p:txBody>
+          <a:bodyPr/>
+          <a:lstStyle/>
+          <a:p>
+            <a:r>
+              <a:rPr lang="en-DE" dirty="0"/>
+              <a:t>Conclusion</a:t>
+            </a:r>
+          </a:p>
+        </p:txBody>
+      </p:sp>
+      <p:sp>
+        <p:nvSpPr>
+          <p:cNvPr id="3" name="Content Placeholder 2">
+            <a:extLst>
+              <a:ext uri="{FF2B5EF4-FFF2-40B4-BE49-F238E27FC236}">
+                <a16:creationId xmlns:a16="http://schemas.microsoft.com/office/drawing/2014/main" id="{0A837E83-D979-8B4D-ABC4-44BC69F97DB1}"/>
+              </a:ext>
+            </a:extLst>
+          </p:cNvPr>
+          <p:cNvSpPr>
+            <a:spLocks noGrp="1"/>
+          </p:cNvSpPr>
+          <p:nvPr>
+            <p:ph idx="1"/>
+          </p:nvPr>
+        </p:nvSpPr>
+        <p:spPr/>
+        <p:txBody>
+          <a:bodyPr/>
+          <a:lstStyle/>
+          <a:p>
+            <a:endParaRPr lang="en-DE"/>
+          </a:p>
+        </p:txBody>
+      </p:sp>
+    </p:spTree>
+    <p:extLst>
+      <p:ext uri="{BB962C8B-B14F-4D97-AF65-F5344CB8AC3E}">
+        <p14:creationId xmlns:p14="http://schemas.microsoft.com/office/powerpoint/2010/main" val="1411150145"/>
       </p:ext>
     </p:extLst>
   </p:cSld>

</xml_diff>

<commit_message>
Work on presentation structure.
</commit_message>
<xml_diff>
--- a/project/04-presentation/presentation.pptx
+++ b/project/04-presentation/presentation.pptx
@@ -6,13 +6,16 @@
   </p:sldMasterIdLst>
   <p:sldIdLst>
     <p:sldId id="256" r:id="rId2"/>
-    <p:sldId id="257" r:id="rId3"/>
-    <p:sldId id="258" r:id="rId4"/>
-    <p:sldId id="261" r:id="rId5"/>
-    <p:sldId id="259" r:id="rId6"/>
-    <p:sldId id="260" r:id="rId7"/>
-    <p:sldId id="262" r:id="rId8"/>
-    <p:sldId id="263" r:id="rId9"/>
+    <p:sldId id="265" r:id="rId3"/>
+    <p:sldId id="257" r:id="rId4"/>
+    <p:sldId id="258" r:id="rId5"/>
+    <p:sldId id="261" r:id="rId6"/>
+    <p:sldId id="259" r:id="rId7"/>
+    <p:sldId id="260" r:id="rId8"/>
+    <p:sldId id="262" r:id="rId9"/>
+    <p:sldId id="264" r:id="rId10"/>
+    <p:sldId id="263" r:id="rId11"/>
+    <p:sldId id="266" r:id="rId12"/>
   </p:sldIdLst>
   <p:sldSz cx="12192000" cy="6858000"/>
   <p:notesSz cx="6858000" cy="9144000"/>
@@ -5731,6 +5734,172 @@
 </p:sld>
 </file>
 
+<file path=ppt/slides/slide10.xml><?xml version="1.0" encoding="utf-8"?>
+<p:sld xmlns:a="http://schemas.openxmlformats.org/drawingml/2006/main" xmlns:r="http://schemas.openxmlformats.org/officeDocument/2006/relationships" xmlns:p="http://schemas.openxmlformats.org/presentationml/2006/main">
+  <p:cSld>
+    <p:spTree>
+      <p:nvGrpSpPr>
+        <p:cNvPr id="1" name=""/>
+        <p:cNvGrpSpPr/>
+        <p:nvPr/>
+      </p:nvGrpSpPr>
+      <p:grpSpPr>
+        <a:xfrm>
+          <a:off x="0" y="0"/>
+          <a:ext cx="0" cy="0"/>
+          <a:chOff x="0" y="0"/>
+          <a:chExt cx="0" cy="0"/>
+        </a:xfrm>
+      </p:grpSpPr>
+      <p:sp>
+        <p:nvSpPr>
+          <p:cNvPr id="2" name="Title 1">
+            <a:extLst>
+              <a:ext uri="{FF2B5EF4-FFF2-40B4-BE49-F238E27FC236}">
+                <a16:creationId xmlns:a16="http://schemas.microsoft.com/office/drawing/2014/main" id="{9169552A-FC02-7C4A-93F3-14B5ACAC67DD}"/>
+              </a:ext>
+            </a:extLst>
+          </p:cNvPr>
+          <p:cNvSpPr>
+            <a:spLocks noGrp="1"/>
+          </p:cNvSpPr>
+          <p:nvPr>
+            <p:ph type="title"/>
+          </p:nvPr>
+        </p:nvSpPr>
+        <p:spPr/>
+        <p:txBody>
+          <a:bodyPr/>
+          <a:lstStyle/>
+          <a:p>
+            <a:r>
+              <a:rPr lang="en-DE" dirty="0"/>
+              <a:t>Review and Conclusion</a:t>
+            </a:r>
+          </a:p>
+        </p:txBody>
+      </p:sp>
+      <p:sp>
+        <p:nvSpPr>
+          <p:cNvPr id="3" name="Content Placeholder 2">
+            <a:extLst>
+              <a:ext uri="{FF2B5EF4-FFF2-40B4-BE49-F238E27FC236}">
+                <a16:creationId xmlns:a16="http://schemas.microsoft.com/office/drawing/2014/main" id="{0A837E83-D979-8B4D-ABC4-44BC69F97DB1}"/>
+              </a:ext>
+            </a:extLst>
+          </p:cNvPr>
+          <p:cNvSpPr>
+            <a:spLocks noGrp="1"/>
+          </p:cNvSpPr>
+          <p:nvPr>
+            <p:ph idx="1"/>
+          </p:nvPr>
+        </p:nvSpPr>
+        <p:spPr/>
+        <p:txBody>
+          <a:bodyPr/>
+          <a:lstStyle/>
+          <a:p>
+            <a:endParaRPr lang="en-DE"/>
+          </a:p>
+        </p:txBody>
+      </p:sp>
+    </p:spTree>
+    <p:extLst>
+      <p:ext uri="{BB962C8B-B14F-4D97-AF65-F5344CB8AC3E}">
+        <p14:creationId xmlns:p14="http://schemas.microsoft.com/office/powerpoint/2010/main" val="1411150145"/>
+      </p:ext>
+    </p:extLst>
+  </p:cSld>
+  <p:clrMapOvr>
+    <a:masterClrMapping/>
+  </p:clrMapOvr>
+</p:sld>
+</file>
+
+<file path=ppt/slides/slide11.xml><?xml version="1.0" encoding="utf-8"?>
+<p:sld xmlns:a="http://schemas.openxmlformats.org/drawingml/2006/main" xmlns:r="http://schemas.openxmlformats.org/officeDocument/2006/relationships" xmlns:p="http://schemas.openxmlformats.org/presentationml/2006/main">
+  <p:cSld>
+    <p:spTree>
+      <p:nvGrpSpPr>
+        <p:cNvPr id="1" name=""/>
+        <p:cNvGrpSpPr/>
+        <p:nvPr/>
+      </p:nvGrpSpPr>
+      <p:grpSpPr>
+        <a:xfrm>
+          <a:off x="0" y="0"/>
+          <a:ext cx="0" cy="0"/>
+          <a:chOff x="0" y="0"/>
+          <a:chExt cx="0" cy="0"/>
+        </a:xfrm>
+      </p:grpSpPr>
+      <p:sp>
+        <p:nvSpPr>
+          <p:cNvPr id="2" name="Title 1">
+            <a:extLst>
+              <a:ext uri="{FF2B5EF4-FFF2-40B4-BE49-F238E27FC236}">
+                <a16:creationId xmlns:a16="http://schemas.microsoft.com/office/drawing/2014/main" id="{864FBA43-C8BE-4D4C-87A8-D8CF32007B39}"/>
+              </a:ext>
+            </a:extLst>
+          </p:cNvPr>
+          <p:cNvSpPr>
+            <a:spLocks noGrp="1"/>
+          </p:cNvSpPr>
+          <p:nvPr>
+            <p:ph type="title"/>
+          </p:nvPr>
+        </p:nvSpPr>
+        <p:spPr/>
+        <p:txBody>
+          <a:bodyPr/>
+          <a:lstStyle/>
+          <a:p>
+            <a:r>
+              <a:rPr lang="en-DE" dirty="0"/>
+              <a:t>Thank You</a:t>
+            </a:r>
+          </a:p>
+        </p:txBody>
+      </p:sp>
+      <p:sp>
+        <p:nvSpPr>
+          <p:cNvPr id="3" name="Content Placeholder 2">
+            <a:extLst>
+              <a:ext uri="{FF2B5EF4-FFF2-40B4-BE49-F238E27FC236}">
+                <a16:creationId xmlns:a16="http://schemas.microsoft.com/office/drawing/2014/main" id="{BA128147-C128-5946-B9AF-673CDFC7D8C8}"/>
+              </a:ext>
+            </a:extLst>
+          </p:cNvPr>
+          <p:cNvSpPr>
+            <a:spLocks noGrp="1"/>
+          </p:cNvSpPr>
+          <p:nvPr>
+            <p:ph idx="1"/>
+          </p:nvPr>
+        </p:nvSpPr>
+        <p:spPr/>
+        <p:txBody>
+          <a:bodyPr/>
+          <a:lstStyle/>
+          <a:p>
+            <a:endParaRPr lang="en-DE"/>
+          </a:p>
+        </p:txBody>
+      </p:sp>
+    </p:spTree>
+    <p:extLst>
+      <p:ext uri="{BB962C8B-B14F-4D97-AF65-F5344CB8AC3E}">
+        <p14:creationId xmlns:p14="http://schemas.microsoft.com/office/powerpoint/2010/main" val="405011617"/>
+      </p:ext>
+    </p:extLst>
+  </p:cSld>
+  <p:clrMapOvr>
+    <a:masterClrMapping/>
+  </p:clrMapOvr>
+</p:sld>
+</file>
+
 <file path=ppt/slides/slide2.xml><?xml version="1.0" encoding="utf-8"?>
 <p:sld xmlns:a="http://schemas.openxmlformats.org/drawingml/2006/main" xmlns:r="http://schemas.openxmlformats.org/officeDocument/2006/relationships" xmlns:p="http://schemas.openxmlformats.org/presentationml/2006/main">
   <p:cSld>
@@ -5753,7 +5922,7 @@
           <p:cNvPr id="2" name="Title 1">
             <a:extLst>
               <a:ext uri="{FF2B5EF4-FFF2-40B4-BE49-F238E27FC236}">
-                <a16:creationId xmlns:a16="http://schemas.microsoft.com/office/drawing/2014/main" id="{6B657D03-958C-284D-9791-C2000607D52E}"/>
+                <a16:creationId xmlns:a16="http://schemas.microsoft.com/office/drawing/2014/main" id="{55BF4BE0-6CE0-314B-9C5D-0012406138BE}"/>
               </a:ext>
             </a:extLst>
           </p:cNvPr>
@@ -5771,7 +5940,7 @@
           <a:p>
             <a:r>
               <a:rPr lang="en-DE" dirty="0"/>
-              <a:t>Introduction</a:t>
+              <a:t>Short Overview</a:t>
             </a:r>
           </a:p>
         </p:txBody>
@@ -5781,7 +5950,7 @@
           <p:cNvPr id="3" name="Content Placeholder 2">
             <a:extLst>
               <a:ext uri="{FF2B5EF4-FFF2-40B4-BE49-F238E27FC236}">
-                <a16:creationId xmlns:a16="http://schemas.microsoft.com/office/drawing/2014/main" id="{BC28FF24-7889-6242-A147-8274A53C26CE}"/>
+                <a16:creationId xmlns:a16="http://schemas.microsoft.com/office/drawing/2014/main" id="{4DE30033-0C89-0E42-ADED-80CF4112F411}"/>
               </a:ext>
             </a:extLst>
           </p:cNvPr>
@@ -5797,14 +5966,14 @@
           <a:bodyPr/>
           <a:lstStyle/>
           <a:p>
-            <a:endParaRPr lang="en-DE" dirty="0"/>
+            <a:endParaRPr lang="en-DE"/>
           </a:p>
         </p:txBody>
       </p:sp>
     </p:spTree>
     <p:extLst>
       <p:ext uri="{BB962C8B-B14F-4D97-AF65-F5344CB8AC3E}">
-        <p14:creationId xmlns:p14="http://schemas.microsoft.com/office/powerpoint/2010/main" val="3037554933"/>
+        <p14:creationId xmlns:p14="http://schemas.microsoft.com/office/powerpoint/2010/main" val="1348440332"/>
       </p:ext>
     </p:extLst>
   </p:cSld>
@@ -5836,7 +6005,7 @@
           <p:cNvPr id="2" name="Title 1">
             <a:extLst>
               <a:ext uri="{FF2B5EF4-FFF2-40B4-BE49-F238E27FC236}">
-                <a16:creationId xmlns:a16="http://schemas.microsoft.com/office/drawing/2014/main" id="{1487B8BA-7F5C-7B4E-9612-08C24C2E2D1C}"/>
+                <a16:creationId xmlns:a16="http://schemas.microsoft.com/office/drawing/2014/main" id="{6B657D03-958C-284D-9791-C2000607D52E}"/>
               </a:ext>
             </a:extLst>
           </p:cNvPr>
@@ -5854,7 +6023,7 @@
           <a:p>
             <a:r>
               <a:rPr lang="en-DE" dirty="0"/>
-              <a:t>Requirements</a:t>
+              <a:t>Introduction</a:t>
             </a:r>
           </a:p>
         </p:txBody>
@@ -5864,7 +6033,7 @@
           <p:cNvPr id="3" name="Content Placeholder 2">
             <a:extLst>
               <a:ext uri="{FF2B5EF4-FFF2-40B4-BE49-F238E27FC236}">
-                <a16:creationId xmlns:a16="http://schemas.microsoft.com/office/drawing/2014/main" id="{DD5D1A2D-5C69-AC41-99A7-CF12FBA521D9}"/>
+                <a16:creationId xmlns:a16="http://schemas.microsoft.com/office/drawing/2014/main" id="{BC28FF24-7889-6242-A147-8274A53C26CE}"/>
               </a:ext>
             </a:extLst>
           </p:cNvPr>
@@ -5880,14 +6049,14 @@
           <a:bodyPr/>
           <a:lstStyle/>
           <a:p>
-            <a:endParaRPr lang="en-DE"/>
+            <a:endParaRPr lang="en-DE" dirty="0"/>
           </a:p>
         </p:txBody>
       </p:sp>
     </p:spTree>
     <p:extLst>
       <p:ext uri="{BB962C8B-B14F-4D97-AF65-F5344CB8AC3E}">
-        <p14:creationId xmlns:p14="http://schemas.microsoft.com/office/powerpoint/2010/main" val="3747206429"/>
+        <p14:creationId xmlns:p14="http://schemas.microsoft.com/office/powerpoint/2010/main" val="3037554933"/>
       </p:ext>
     </p:extLst>
   </p:cSld>
@@ -5919,7 +6088,7 @@
           <p:cNvPr id="2" name="Title 1">
             <a:extLst>
               <a:ext uri="{FF2B5EF4-FFF2-40B4-BE49-F238E27FC236}">
-                <a16:creationId xmlns:a16="http://schemas.microsoft.com/office/drawing/2014/main" id="{9E46FF31-07D7-434E-8774-519E2701CE11}"/>
+                <a16:creationId xmlns:a16="http://schemas.microsoft.com/office/drawing/2014/main" id="{1487B8BA-7F5C-7B4E-9612-08C24C2E2D1C}"/>
               </a:ext>
             </a:extLst>
           </p:cNvPr>
@@ -5937,7 +6106,7 @@
           <a:p>
             <a:r>
               <a:rPr lang="en-DE" dirty="0"/>
-              <a:t>Class Diagram</a:t>
+              <a:t>Requirements</a:t>
             </a:r>
           </a:p>
         </p:txBody>
@@ -5947,7 +6116,7 @@
           <p:cNvPr id="3" name="Content Placeholder 2">
             <a:extLst>
               <a:ext uri="{FF2B5EF4-FFF2-40B4-BE49-F238E27FC236}">
-                <a16:creationId xmlns:a16="http://schemas.microsoft.com/office/drawing/2014/main" id="{5346A739-9DF0-4E4D-AE38-1C82E89735B7}"/>
+                <a16:creationId xmlns:a16="http://schemas.microsoft.com/office/drawing/2014/main" id="{DD5D1A2D-5C69-AC41-99A7-CF12FBA521D9}"/>
               </a:ext>
             </a:extLst>
           </p:cNvPr>
@@ -5970,7 +6139,7 @@
     </p:spTree>
     <p:extLst>
       <p:ext uri="{BB962C8B-B14F-4D97-AF65-F5344CB8AC3E}">
-        <p14:creationId xmlns:p14="http://schemas.microsoft.com/office/powerpoint/2010/main" val="3175897578"/>
+        <p14:creationId xmlns:p14="http://schemas.microsoft.com/office/powerpoint/2010/main" val="3747206429"/>
       </p:ext>
     </p:extLst>
   </p:cSld>
@@ -6002,7 +6171,7 @@
           <p:cNvPr id="2" name="Title 1">
             <a:extLst>
               <a:ext uri="{FF2B5EF4-FFF2-40B4-BE49-F238E27FC236}">
-                <a16:creationId xmlns:a16="http://schemas.microsoft.com/office/drawing/2014/main" id="{81D4C5FA-360C-CC4D-8E4D-78F7028815B4}"/>
+                <a16:creationId xmlns:a16="http://schemas.microsoft.com/office/drawing/2014/main" id="{9E46FF31-07D7-434E-8774-519E2701CE11}"/>
               </a:ext>
             </a:extLst>
           </p:cNvPr>
@@ -6020,7 +6189,7 @@
           <a:p>
             <a:r>
               <a:rPr lang="en-DE" dirty="0"/>
-              <a:t>Use-Case Diagram</a:t>
+              <a:t>Class Diagram</a:t>
             </a:r>
           </a:p>
         </p:txBody>
@@ -6030,7 +6199,7 @@
           <p:cNvPr id="3" name="Content Placeholder 2">
             <a:extLst>
               <a:ext uri="{FF2B5EF4-FFF2-40B4-BE49-F238E27FC236}">
-                <a16:creationId xmlns:a16="http://schemas.microsoft.com/office/drawing/2014/main" id="{21559E1A-EFE7-EB46-84A4-7ACB4A357570}"/>
+                <a16:creationId xmlns:a16="http://schemas.microsoft.com/office/drawing/2014/main" id="{5346A739-9DF0-4E4D-AE38-1C82E89735B7}"/>
               </a:ext>
             </a:extLst>
           </p:cNvPr>
@@ -6046,14 +6215,14 @@
           <a:bodyPr/>
           <a:lstStyle/>
           <a:p>
-            <a:endParaRPr lang="en-DE" dirty="0"/>
+            <a:endParaRPr lang="en-DE"/>
           </a:p>
         </p:txBody>
       </p:sp>
     </p:spTree>
     <p:extLst>
       <p:ext uri="{BB962C8B-B14F-4D97-AF65-F5344CB8AC3E}">
-        <p14:creationId xmlns:p14="http://schemas.microsoft.com/office/powerpoint/2010/main" val="2943699180"/>
+        <p14:creationId xmlns:p14="http://schemas.microsoft.com/office/powerpoint/2010/main" val="3175897578"/>
       </p:ext>
     </p:extLst>
   </p:cSld>
@@ -6085,7 +6254,7 @@
           <p:cNvPr id="2" name="Title 1">
             <a:extLst>
               <a:ext uri="{FF2B5EF4-FFF2-40B4-BE49-F238E27FC236}">
-                <a16:creationId xmlns:a16="http://schemas.microsoft.com/office/drawing/2014/main" id="{FEB63499-928A-EA4A-AD45-E22AE8DDAB86}"/>
+                <a16:creationId xmlns:a16="http://schemas.microsoft.com/office/drawing/2014/main" id="{81D4C5FA-360C-CC4D-8E4D-78F7028815B4}"/>
               </a:ext>
             </a:extLst>
           </p:cNvPr>
@@ -6103,7 +6272,7 @@
           <a:p>
             <a:r>
               <a:rPr lang="en-DE" dirty="0"/>
-              <a:t>Activity Diagram</a:t>
+              <a:t>Use-Case Diagram</a:t>
             </a:r>
           </a:p>
         </p:txBody>
@@ -6113,7 +6282,7 @@
           <p:cNvPr id="3" name="Content Placeholder 2">
             <a:extLst>
               <a:ext uri="{FF2B5EF4-FFF2-40B4-BE49-F238E27FC236}">
-                <a16:creationId xmlns:a16="http://schemas.microsoft.com/office/drawing/2014/main" id="{7A8B443F-ECC2-3545-954E-63990F7541C0}"/>
+                <a16:creationId xmlns:a16="http://schemas.microsoft.com/office/drawing/2014/main" id="{21559E1A-EFE7-EB46-84A4-7ACB4A357570}"/>
               </a:ext>
             </a:extLst>
           </p:cNvPr>
@@ -6129,14 +6298,14 @@
           <a:bodyPr/>
           <a:lstStyle/>
           <a:p>
-            <a:endParaRPr lang="en-DE"/>
+            <a:endParaRPr lang="en-DE" dirty="0"/>
           </a:p>
         </p:txBody>
       </p:sp>
     </p:spTree>
     <p:extLst>
       <p:ext uri="{BB962C8B-B14F-4D97-AF65-F5344CB8AC3E}">
-        <p14:creationId xmlns:p14="http://schemas.microsoft.com/office/powerpoint/2010/main" val="947049165"/>
+        <p14:creationId xmlns:p14="http://schemas.microsoft.com/office/powerpoint/2010/main" val="2943699180"/>
       </p:ext>
     </p:extLst>
   </p:cSld>
@@ -6168,7 +6337,7 @@
           <p:cNvPr id="2" name="Title 1">
             <a:extLst>
               <a:ext uri="{FF2B5EF4-FFF2-40B4-BE49-F238E27FC236}">
-                <a16:creationId xmlns:a16="http://schemas.microsoft.com/office/drawing/2014/main" id="{065771F3-AF2B-964F-9058-25FFCF110F7F}"/>
+                <a16:creationId xmlns:a16="http://schemas.microsoft.com/office/drawing/2014/main" id="{FEB63499-928A-EA4A-AD45-E22AE8DDAB86}"/>
               </a:ext>
             </a:extLst>
           </p:cNvPr>
@@ -6186,7 +6355,7 @@
           <a:p>
             <a:r>
               <a:rPr lang="en-DE" dirty="0"/>
-              <a:t>Sequence Diagram</a:t>
+              <a:t>Activity Diagram</a:t>
             </a:r>
           </a:p>
         </p:txBody>
@@ -6196,7 +6365,7 @@
           <p:cNvPr id="3" name="Content Placeholder 2">
             <a:extLst>
               <a:ext uri="{FF2B5EF4-FFF2-40B4-BE49-F238E27FC236}">
-                <a16:creationId xmlns:a16="http://schemas.microsoft.com/office/drawing/2014/main" id="{736EBC44-1CAB-C342-AEF4-2805A558B4AA}"/>
+                <a16:creationId xmlns:a16="http://schemas.microsoft.com/office/drawing/2014/main" id="{7A8B443F-ECC2-3545-954E-63990F7541C0}"/>
               </a:ext>
             </a:extLst>
           </p:cNvPr>
@@ -6219,7 +6388,7 @@
     </p:spTree>
     <p:extLst>
       <p:ext uri="{BB962C8B-B14F-4D97-AF65-F5344CB8AC3E}">
-        <p14:creationId xmlns:p14="http://schemas.microsoft.com/office/powerpoint/2010/main" val="1016021226"/>
+        <p14:creationId xmlns:p14="http://schemas.microsoft.com/office/powerpoint/2010/main" val="947049165"/>
       </p:ext>
     </p:extLst>
   </p:cSld>
@@ -6251,7 +6420,7 @@
           <p:cNvPr id="2" name="Title 1">
             <a:extLst>
               <a:ext uri="{FF2B5EF4-FFF2-40B4-BE49-F238E27FC236}">
-                <a16:creationId xmlns:a16="http://schemas.microsoft.com/office/drawing/2014/main" id="{9169552A-FC02-7C4A-93F3-14B5ACAC67DD}"/>
+                <a16:creationId xmlns:a16="http://schemas.microsoft.com/office/drawing/2014/main" id="{065771F3-AF2B-964F-9058-25FFCF110F7F}"/>
               </a:ext>
             </a:extLst>
           </p:cNvPr>
@@ -6269,7 +6438,7 @@
           <a:p>
             <a:r>
               <a:rPr lang="en-DE" dirty="0"/>
-              <a:t>Conclusion</a:t>
+              <a:t>Sequence Diagram</a:t>
             </a:r>
           </a:p>
         </p:txBody>
@@ -6279,7 +6448,7 @@
           <p:cNvPr id="3" name="Content Placeholder 2">
             <a:extLst>
               <a:ext uri="{FF2B5EF4-FFF2-40B4-BE49-F238E27FC236}">
-                <a16:creationId xmlns:a16="http://schemas.microsoft.com/office/drawing/2014/main" id="{0A837E83-D979-8B4D-ABC4-44BC69F97DB1}"/>
+                <a16:creationId xmlns:a16="http://schemas.microsoft.com/office/drawing/2014/main" id="{736EBC44-1CAB-C342-AEF4-2805A558B4AA}"/>
               </a:ext>
             </a:extLst>
           </p:cNvPr>
@@ -6302,7 +6471,90 @@
     </p:spTree>
     <p:extLst>
       <p:ext uri="{BB962C8B-B14F-4D97-AF65-F5344CB8AC3E}">
-        <p14:creationId xmlns:p14="http://schemas.microsoft.com/office/powerpoint/2010/main" val="1411150145"/>
+        <p14:creationId xmlns:p14="http://schemas.microsoft.com/office/powerpoint/2010/main" val="1016021226"/>
+      </p:ext>
+    </p:extLst>
+  </p:cSld>
+  <p:clrMapOvr>
+    <a:masterClrMapping/>
+  </p:clrMapOvr>
+</p:sld>
+</file>
+
+<file path=ppt/slides/slide9.xml><?xml version="1.0" encoding="utf-8"?>
+<p:sld xmlns:a="http://schemas.openxmlformats.org/drawingml/2006/main" xmlns:r="http://schemas.openxmlformats.org/officeDocument/2006/relationships" xmlns:p="http://schemas.openxmlformats.org/presentationml/2006/main">
+  <p:cSld>
+    <p:spTree>
+      <p:nvGrpSpPr>
+        <p:cNvPr id="1" name=""/>
+        <p:cNvGrpSpPr/>
+        <p:nvPr/>
+      </p:nvGrpSpPr>
+      <p:grpSpPr>
+        <a:xfrm>
+          <a:off x="0" y="0"/>
+          <a:ext cx="0" cy="0"/>
+          <a:chOff x="0" y="0"/>
+          <a:chExt cx="0" cy="0"/>
+        </a:xfrm>
+      </p:grpSpPr>
+      <p:sp>
+        <p:nvSpPr>
+          <p:cNvPr id="2" name="Title 1">
+            <a:extLst>
+              <a:ext uri="{FF2B5EF4-FFF2-40B4-BE49-F238E27FC236}">
+                <a16:creationId xmlns:a16="http://schemas.microsoft.com/office/drawing/2014/main" id="{4CF36371-0E45-634F-ACB0-ABB576A7E6F4}"/>
+              </a:ext>
+            </a:extLst>
+          </p:cNvPr>
+          <p:cNvSpPr>
+            <a:spLocks noGrp="1"/>
+          </p:cNvSpPr>
+          <p:nvPr>
+            <p:ph type="title"/>
+          </p:nvPr>
+        </p:nvSpPr>
+        <p:spPr/>
+        <p:txBody>
+          <a:bodyPr/>
+          <a:lstStyle/>
+          <a:p>
+            <a:r>
+              <a:rPr lang="en-DE" dirty="0"/>
+              <a:t>Prototypes</a:t>
+            </a:r>
+          </a:p>
+        </p:txBody>
+      </p:sp>
+      <p:sp>
+        <p:nvSpPr>
+          <p:cNvPr id="3" name="Content Placeholder 2">
+            <a:extLst>
+              <a:ext uri="{FF2B5EF4-FFF2-40B4-BE49-F238E27FC236}">
+                <a16:creationId xmlns:a16="http://schemas.microsoft.com/office/drawing/2014/main" id="{94BCFC23-4B4E-364E-AD43-0A412130774F}"/>
+              </a:ext>
+            </a:extLst>
+          </p:cNvPr>
+          <p:cNvSpPr>
+            <a:spLocks noGrp="1"/>
+          </p:cNvSpPr>
+          <p:nvPr>
+            <p:ph idx="1"/>
+          </p:nvPr>
+        </p:nvSpPr>
+        <p:spPr/>
+        <p:txBody>
+          <a:bodyPr/>
+          <a:lstStyle/>
+          <a:p>
+            <a:endParaRPr lang="en-DE"/>
+          </a:p>
+        </p:txBody>
+      </p:sp>
+    </p:spTree>
+    <p:extLst>
+      <p:ext uri="{BB962C8B-B14F-4D97-AF65-F5344CB8AC3E}">
+        <p14:creationId xmlns:p14="http://schemas.microsoft.com/office/powerpoint/2010/main" val="3776964067"/>
       </p:ext>
     </p:extLst>
   </p:cSld>

</xml_diff>